<commit_message>
Weathermap api and servlet
</commit_message>
<xml_diff>
--- a/WT_LAB.pptx
+++ b/WT_LAB.pptx
@@ -52,6 +52,14 @@
     <p:sldId id="300" r:id="rId46"/>
     <p:sldId id="301" r:id="rId47"/>
     <p:sldId id="302" r:id="rId48"/>
+    <p:sldId id="303" r:id="rId49"/>
+    <p:sldId id="304" r:id="rId50"/>
+    <p:sldId id="310" r:id="rId51"/>
+    <p:sldId id="305" r:id="rId52"/>
+    <p:sldId id="306" r:id="rId53"/>
+    <p:sldId id="307" r:id="rId54"/>
+    <p:sldId id="308" r:id="rId55"/>
+    <p:sldId id="309" r:id="rId56"/>
   </p:sldIdLst>
   <p:sldSz cx="12192000" cy="6858000"/>
   <p:notesSz cx="6858000" cy="9144000"/>
@@ -289,7 +297,7 @@
           <a:p>
             <a:fld id="{2E5EF80D-24CF-4D6B-AE54-277F4074078B}" type="datetimeFigureOut">
               <a:rPr lang="en-US" smtClean="0"/>
-              <a:t>8/27/2019</a:t>
+              <a:t>9/3/2019</a:t>
             </a:fld>
             <a:endParaRPr lang="en-US"/>
           </a:p>
@@ -459,7 +467,7 @@
           <a:p>
             <a:fld id="{2E5EF80D-24CF-4D6B-AE54-277F4074078B}" type="datetimeFigureOut">
               <a:rPr lang="en-US" smtClean="0"/>
-              <a:t>8/27/2019</a:t>
+              <a:t>9/3/2019</a:t>
             </a:fld>
             <a:endParaRPr lang="en-US"/>
           </a:p>
@@ -639,7 +647,7 @@
           <a:p>
             <a:fld id="{2E5EF80D-24CF-4D6B-AE54-277F4074078B}" type="datetimeFigureOut">
               <a:rPr lang="en-US" smtClean="0"/>
-              <a:t>8/27/2019</a:t>
+              <a:t>9/3/2019</a:t>
             </a:fld>
             <a:endParaRPr lang="en-US"/>
           </a:p>
@@ -809,7 +817,7 @@
           <a:p>
             <a:fld id="{2E5EF80D-24CF-4D6B-AE54-277F4074078B}" type="datetimeFigureOut">
               <a:rPr lang="en-US" smtClean="0"/>
-              <a:t>8/27/2019</a:t>
+              <a:t>9/3/2019</a:t>
             </a:fld>
             <a:endParaRPr lang="en-US"/>
           </a:p>
@@ -1055,7 +1063,7 @@
           <a:p>
             <a:fld id="{2E5EF80D-24CF-4D6B-AE54-277F4074078B}" type="datetimeFigureOut">
               <a:rPr lang="en-US" smtClean="0"/>
-              <a:t>8/27/2019</a:t>
+              <a:t>9/3/2019</a:t>
             </a:fld>
             <a:endParaRPr lang="en-US"/>
           </a:p>
@@ -1287,7 +1295,7 @@
           <a:p>
             <a:fld id="{2E5EF80D-24CF-4D6B-AE54-277F4074078B}" type="datetimeFigureOut">
               <a:rPr lang="en-US" smtClean="0"/>
-              <a:t>8/27/2019</a:t>
+              <a:t>9/3/2019</a:t>
             </a:fld>
             <a:endParaRPr lang="en-US"/>
           </a:p>
@@ -1654,7 +1662,7 @@
           <a:p>
             <a:fld id="{2E5EF80D-24CF-4D6B-AE54-277F4074078B}" type="datetimeFigureOut">
               <a:rPr lang="en-US" smtClean="0"/>
-              <a:t>8/27/2019</a:t>
+              <a:t>9/3/2019</a:t>
             </a:fld>
             <a:endParaRPr lang="en-US"/>
           </a:p>
@@ -1772,7 +1780,7 @@
           <a:p>
             <a:fld id="{2E5EF80D-24CF-4D6B-AE54-277F4074078B}" type="datetimeFigureOut">
               <a:rPr lang="en-US" smtClean="0"/>
-              <a:t>8/27/2019</a:t>
+              <a:t>9/3/2019</a:t>
             </a:fld>
             <a:endParaRPr lang="en-US"/>
           </a:p>
@@ -1867,7 +1875,7 @@
           <a:p>
             <a:fld id="{2E5EF80D-24CF-4D6B-AE54-277F4074078B}" type="datetimeFigureOut">
               <a:rPr lang="en-US" smtClean="0"/>
-              <a:t>8/27/2019</a:t>
+              <a:t>9/3/2019</a:t>
             </a:fld>
             <a:endParaRPr lang="en-US"/>
           </a:p>
@@ -2144,7 +2152,7 @@
           <a:p>
             <a:fld id="{2E5EF80D-24CF-4D6B-AE54-277F4074078B}" type="datetimeFigureOut">
               <a:rPr lang="en-US" smtClean="0"/>
-              <a:t>8/27/2019</a:t>
+              <a:t>9/3/2019</a:t>
             </a:fld>
             <a:endParaRPr lang="en-US"/>
           </a:p>
@@ -2397,7 +2405,7 @@
           <a:p>
             <a:fld id="{2E5EF80D-24CF-4D6B-AE54-277F4074078B}" type="datetimeFigureOut">
               <a:rPr lang="en-US" smtClean="0"/>
-              <a:t>8/27/2019</a:t>
+              <a:t>9/3/2019</a:t>
             </a:fld>
             <a:endParaRPr lang="en-US"/>
           </a:p>
@@ -2610,7 +2618,7 @@
           <a:p>
             <a:fld id="{2E5EF80D-24CF-4D6B-AE54-277F4074078B}" type="datetimeFigureOut">
               <a:rPr lang="en-US" smtClean="0"/>
-              <a:t>8/27/2019</a:t>
+              <a:t>9/3/2019</a:t>
             </a:fld>
             <a:endParaRPr lang="en-US"/>
           </a:p>
@@ -8927,7 +8935,23 @@
             <a:pPr lvl="1" algn="just"/>
             <a:r>
               <a:rPr lang="en-US" sz="3000" dirty="0" smtClean="0"/>
-              <a:t>Retrieve the icon from </a:t>
+              <a:t>Retrieve the </a:t>
+            </a:r>
+            <a:r>
+              <a:rPr lang="en-US" sz="3000" dirty="0" smtClean="0"/>
+              <a:t>icon </a:t>
+            </a:r>
+            <a:r>
+              <a:rPr lang="en-US" sz="3000" dirty="0" err="1" smtClean="0"/>
+              <a:t>img</a:t>
+            </a:r>
+            <a:r>
+              <a:rPr lang="en-US" sz="3000" dirty="0" smtClean="0"/>
+              <a:t> </a:t>
+            </a:r>
+            <a:r>
+              <a:rPr lang="en-US" sz="3000" dirty="0" smtClean="0"/>
+              <a:t>from </a:t>
             </a:r>
             <a:r>
               <a:rPr lang="en-US" sz="3000" dirty="0" err="1" smtClean="0"/>
@@ -9105,6 +9129,3339 @@
 </p:sld>
 </file>
 
+<file path=ppt/slides/slide48.xml><?xml version="1.0" encoding="utf-8"?>
+<p:sld xmlns:a="http://schemas.openxmlformats.org/drawingml/2006/main" xmlns:r="http://schemas.openxmlformats.org/officeDocument/2006/relationships" xmlns:p="http://schemas.openxmlformats.org/presentationml/2006/main">
+  <p:cSld>
+    <p:spTree>
+      <p:nvGrpSpPr>
+        <p:cNvPr id="1" name=""/>
+        <p:cNvGrpSpPr/>
+        <p:nvPr/>
+      </p:nvGrpSpPr>
+      <p:grpSpPr>
+        <a:xfrm>
+          <a:off x="0" y="0"/>
+          <a:ext cx="0" cy="0"/>
+          <a:chOff x="0" y="0"/>
+          <a:chExt cx="0" cy="0"/>
+        </a:xfrm>
+      </p:grpSpPr>
+      <p:sp>
+        <p:nvSpPr>
+          <p:cNvPr id="2" name="Title 1"/>
+          <p:cNvSpPr>
+            <a:spLocks noGrp="1"/>
+          </p:cNvSpPr>
+          <p:nvPr>
+            <p:ph type="title"/>
+          </p:nvPr>
+        </p:nvSpPr>
+        <p:spPr/>
+        <p:txBody>
+          <a:bodyPr/>
+          <a:lstStyle/>
+          <a:p>
+            <a:r>
+              <a:rPr lang="en-US" dirty="0" smtClean="0"/>
+              <a:t>Working with Servlets</a:t>
+            </a:r>
+            <a:endParaRPr lang="en-US" dirty="0"/>
+          </a:p>
+        </p:txBody>
+      </p:sp>
+      <p:sp>
+        <p:nvSpPr>
+          <p:cNvPr id="3" name="Content Placeholder 2"/>
+          <p:cNvSpPr>
+            <a:spLocks noGrp="1"/>
+          </p:cNvSpPr>
+          <p:nvPr>
+            <p:ph idx="1"/>
+          </p:nvPr>
+        </p:nvSpPr>
+        <p:spPr>
+          <a:xfrm>
+            <a:off x="754117" y="2182977"/>
+            <a:ext cx="10515600" cy="1243396"/>
+          </a:xfrm>
+        </p:spPr>
+        <p:txBody>
+          <a:bodyPr/>
+          <a:lstStyle/>
+          <a:p>
+            <a:r>
+              <a:rPr lang="en-US" dirty="0"/>
+              <a:t>Create a simple servlet to print basic &lt;h&gt; </a:t>
+            </a:r>
+            <a:r>
+              <a:rPr lang="en-US" dirty="0" smtClean="0"/>
+              <a:t>tags.</a:t>
+            </a:r>
+          </a:p>
+          <a:p>
+            <a:r>
+              <a:rPr lang="en-US" dirty="0" smtClean="0"/>
+              <a:t>Create a simple button and invoke a servlet on button click. </a:t>
+            </a:r>
+            <a:endParaRPr lang="en-US" dirty="0"/>
+          </a:p>
+        </p:txBody>
+      </p:sp>
+    </p:spTree>
+    <p:extLst>
+      <p:ext uri="{BB962C8B-B14F-4D97-AF65-F5344CB8AC3E}">
+        <p14:creationId xmlns:p14="http://schemas.microsoft.com/office/powerpoint/2010/main" val="4241736785"/>
+      </p:ext>
+    </p:extLst>
+  </p:cSld>
+  <p:clrMapOvr>
+    <a:masterClrMapping/>
+  </p:clrMapOvr>
+</p:sld>
+</file>
+
+<file path=ppt/slides/slide49.xml><?xml version="1.0" encoding="utf-8"?>
+<p:sld xmlns:a="http://schemas.openxmlformats.org/drawingml/2006/main" xmlns:r="http://schemas.openxmlformats.org/officeDocument/2006/relationships" xmlns:p="http://schemas.openxmlformats.org/presentationml/2006/main">
+  <p:cSld>
+    <p:spTree>
+      <p:nvGrpSpPr>
+        <p:cNvPr id="1" name=""/>
+        <p:cNvGrpSpPr/>
+        <p:nvPr/>
+      </p:nvGrpSpPr>
+      <p:grpSpPr>
+        <a:xfrm>
+          <a:off x="0" y="0"/>
+          <a:ext cx="0" cy="0"/>
+          <a:chOff x="0" y="0"/>
+          <a:chExt cx="0" cy="0"/>
+        </a:xfrm>
+      </p:grpSpPr>
+      <p:sp>
+        <p:nvSpPr>
+          <p:cNvPr id="4" name="Rectangle 2"/>
+          <p:cNvSpPr>
+            <a:spLocks noGrp="1" noChangeArrowheads="1"/>
+          </p:cNvSpPr>
+          <p:nvPr>
+            <p:ph type="title"/>
+          </p:nvPr>
+        </p:nvSpPr>
+        <p:spPr>
+          <a:xfrm>
+            <a:off x="144518" y="148651"/>
+            <a:ext cx="7772400" cy="1143000"/>
+          </a:xfrm>
+        </p:spPr>
+        <p:txBody>
+          <a:bodyPr/>
+          <a:lstStyle/>
+          <a:p>
+            <a:r>
+              <a:rPr lang="en-US" altLang="en-US" dirty="0" smtClean="0"/>
+              <a:t>Life Cycle of Servlet</a:t>
+            </a:r>
+          </a:p>
+        </p:txBody>
+      </p:sp>
+      <p:sp>
+        <p:nvSpPr>
+          <p:cNvPr id="5" name="Rectangle 3"/>
+          <p:cNvSpPr txBox="1">
+            <a:spLocks noChangeArrowheads="1"/>
+          </p:cNvSpPr>
+          <p:nvPr/>
+        </p:nvSpPr>
+        <p:spPr>
+          <a:xfrm>
+            <a:off x="2372711" y="3231931"/>
+            <a:ext cx="2971800" cy="685800"/>
+          </a:xfrm>
+          <a:prstGeom prst="rect">
+            <a:avLst/>
+          </a:prstGeom>
+        </p:spPr>
+        <p:txBody>
+          <a:bodyPr vert="horz" lIns="91440" tIns="45720" rIns="91440" bIns="45720" rtlCol="0">
+            <a:normAutofit/>
+          </a:bodyPr>
+          <a:lstStyle>
+            <a:lvl1pPr marL="228600" indent="-228600" algn="l" defTabSz="914400" rtl="0" eaLnBrk="1" latinLnBrk="0" hangingPunct="1">
+              <a:lnSpc>
+                <a:spcPct val="90000"/>
+              </a:lnSpc>
+              <a:spcBef>
+                <a:spcPts val="1000"/>
+              </a:spcBef>
+              <a:buFont typeface="Arial" panose="020B0604020202020204" pitchFamily="34" charset="0"/>
+              <a:buChar char="•"/>
+              <a:defRPr sz="2800" kern="1200">
+                <a:solidFill>
+                  <a:schemeClr val="tx1"/>
+                </a:solidFill>
+                <a:latin typeface="+mn-lt"/>
+                <a:ea typeface="+mn-ea"/>
+                <a:cs typeface="+mn-cs"/>
+              </a:defRPr>
+            </a:lvl1pPr>
+            <a:lvl2pPr marL="685800" indent="-228600" algn="l" defTabSz="914400" rtl="0" eaLnBrk="1" latinLnBrk="0" hangingPunct="1">
+              <a:lnSpc>
+                <a:spcPct val="90000"/>
+              </a:lnSpc>
+              <a:spcBef>
+                <a:spcPts val="500"/>
+              </a:spcBef>
+              <a:buFont typeface="Arial" panose="020B0604020202020204" pitchFamily="34" charset="0"/>
+              <a:buChar char="•"/>
+              <a:defRPr sz="2400" kern="1200">
+                <a:solidFill>
+                  <a:schemeClr val="tx1"/>
+                </a:solidFill>
+                <a:latin typeface="+mn-lt"/>
+                <a:ea typeface="+mn-ea"/>
+                <a:cs typeface="+mn-cs"/>
+              </a:defRPr>
+            </a:lvl2pPr>
+            <a:lvl3pPr marL="1143000" indent="-228600" algn="l" defTabSz="914400" rtl="0" eaLnBrk="1" latinLnBrk="0" hangingPunct="1">
+              <a:lnSpc>
+                <a:spcPct val="90000"/>
+              </a:lnSpc>
+              <a:spcBef>
+                <a:spcPts val="500"/>
+              </a:spcBef>
+              <a:buFont typeface="Arial" panose="020B0604020202020204" pitchFamily="34" charset="0"/>
+              <a:buChar char="•"/>
+              <a:defRPr sz="2000" kern="1200">
+                <a:solidFill>
+                  <a:schemeClr val="tx1"/>
+                </a:solidFill>
+                <a:latin typeface="+mn-lt"/>
+                <a:ea typeface="+mn-ea"/>
+                <a:cs typeface="+mn-cs"/>
+              </a:defRPr>
+            </a:lvl3pPr>
+            <a:lvl4pPr marL="1600200" indent="-228600" algn="l" defTabSz="914400" rtl="0" eaLnBrk="1" latinLnBrk="0" hangingPunct="1">
+              <a:lnSpc>
+                <a:spcPct val="90000"/>
+              </a:lnSpc>
+              <a:spcBef>
+                <a:spcPts val="500"/>
+              </a:spcBef>
+              <a:buFont typeface="Arial" panose="020B0604020202020204" pitchFamily="34" charset="0"/>
+              <a:buChar char="•"/>
+              <a:defRPr sz="1800" kern="1200">
+                <a:solidFill>
+                  <a:schemeClr val="tx1"/>
+                </a:solidFill>
+                <a:latin typeface="+mn-lt"/>
+                <a:ea typeface="+mn-ea"/>
+                <a:cs typeface="+mn-cs"/>
+              </a:defRPr>
+            </a:lvl4pPr>
+            <a:lvl5pPr marL="2057400" indent="-228600" algn="l" defTabSz="914400" rtl="0" eaLnBrk="1" latinLnBrk="0" hangingPunct="1">
+              <a:lnSpc>
+                <a:spcPct val="90000"/>
+              </a:lnSpc>
+              <a:spcBef>
+                <a:spcPts val="500"/>
+              </a:spcBef>
+              <a:buFont typeface="Arial" panose="020B0604020202020204" pitchFamily="34" charset="0"/>
+              <a:buChar char="•"/>
+              <a:defRPr sz="1800" kern="1200">
+                <a:solidFill>
+                  <a:schemeClr val="tx1"/>
+                </a:solidFill>
+                <a:latin typeface="+mn-lt"/>
+                <a:ea typeface="+mn-ea"/>
+                <a:cs typeface="+mn-cs"/>
+              </a:defRPr>
+            </a:lvl5pPr>
+            <a:lvl6pPr marL="2514600" indent="-228600" algn="l" defTabSz="914400" rtl="0" eaLnBrk="1" latinLnBrk="0" hangingPunct="1">
+              <a:lnSpc>
+                <a:spcPct val="90000"/>
+              </a:lnSpc>
+              <a:spcBef>
+                <a:spcPts val="500"/>
+              </a:spcBef>
+              <a:buFont typeface="Arial" panose="020B0604020202020204" pitchFamily="34" charset="0"/>
+              <a:buChar char="•"/>
+              <a:defRPr sz="1800" kern="1200">
+                <a:solidFill>
+                  <a:schemeClr val="tx1"/>
+                </a:solidFill>
+                <a:latin typeface="+mn-lt"/>
+                <a:ea typeface="+mn-ea"/>
+                <a:cs typeface="+mn-cs"/>
+              </a:defRPr>
+            </a:lvl6pPr>
+            <a:lvl7pPr marL="2971800" indent="-228600" algn="l" defTabSz="914400" rtl="0" eaLnBrk="1" latinLnBrk="0" hangingPunct="1">
+              <a:lnSpc>
+                <a:spcPct val="90000"/>
+              </a:lnSpc>
+              <a:spcBef>
+                <a:spcPts val="500"/>
+              </a:spcBef>
+              <a:buFont typeface="Arial" panose="020B0604020202020204" pitchFamily="34" charset="0"/>
+              <a:buChar char="•"/>
+              <a:defRPr sz="1800" kern="1200">
+                <a:solidFill>
+                  <a:schemeClr val="tx1"/>
+                </a:solidFill>
+                <a:latin typeface="+mn-lt"/>
+                <a:ea typeface="+mn-ea"/>
+                <a:cs typeface="+mn-cs"/>
+              </a:defRPr>
+            </a:lvl7pPr>
+            <a:lvl8pPr marL="3429000" indent="-228600" algn="l" defTabSz="914400" rtl="0" eaLnBrk="1" latinLnBrk="0" hangingPunct="1">
+              <a:lnSpc>
+                <a:spcPct val="90000"/>
+              </a:lnSpc>
+              <a:spcBef>
+                <a:spcPts val="500"/>
+              </a:spcBef>
+              <a:buFont typeface="Arial" panose="020B0604020202020204" pitchFamily="34" charset="0"/>
+              <a:buChar char="•"/>
+              <a:defRPr sz="1800" kern="1200">
+                <a:solidFill>
+                  <a:schemeClr val="tx1"/>
+                </a:solidFill>
+                <a:latin typeface="+mn-lt"/>
+                <a:ea typeface="+mn-ea"/>
+                <a:cs typeface="+mn-cs"/>
+              </a:defRPr>
+            </a:lvl8pPr>
+            <a:lvl9pPr marL="3886200" indent="-228600" algn="l" defTabSz="914400" rtl="0" eaLnBrk="1" latinLnBrk="0" hangingPunct="1">
+              <a:lnSpc>
+                <a:spcPct val="90000"/>
+              </a:lnSpc>
+              <a:spcBef>
+                <a:spcPts val="500"/>
+              </a:spcBef>
+              <a:buFont typeface="Arial" panose="020B0604020202020204" pitchFamily="34" charset="0"/>
+              <a:buChar char="•"/>
+              <a:defRPr sz="1800" kern="1200">
+                <a:solidFill>
+                  <a:schemeClr val="tx1"/>
+                </a:solidFill>
+                <a:latin typeface="+mn-lt"/>
+                <a:ea typeface="+mn-ea"/>
+                <a:cs typeface="+mn-cs"/>
+              </a:defRPr>
+            </a:lvl9pPr>
+          </a:lstStyle>
+          <a:p>
+            <a:pPr>
+              <a:buFontTx/>
+              <a:buNone/>
+            </a:pPr>
+            <a:r>
+              <a:rPr lang="en-US" altLang="en-US" sz="2400" smtClean="0"/>
+              <a:t>init(</a:t>
+            </a:r>
+            <a:r>
+              <a:rPr lang="en-US" altLang="en-US" sz="1800" smtClean="0"/>
+              <a:t>ServletConfig</a:t>
+            </a:r>
+            <a:r>
+              <a:rPr lang="en-US" altLang="en-US" sz="2400" smtClean="0"/>
+              <a:t>);</a:t>
+            </a:r>
+          </a:p>
+          <a:p>
+            <a:pPr>
+              <a:buFontTx/>
+              <a:buNone/>
+            </a:pPr>
+            <a:endParaRPr lang="en-US" altLang="en-US" sz="2400" smtClean="0"/>
+          </a:p>
+          <a:p>
+            <a:pPr>
+              <a:buFontTx/>
+              <a:buNone/>
+            </a:pPr>
+            <a:endParaRPr lang="en-US" altLang="en-US" sz="2400" smtClean="0"/>
+          </a:p>
+          <a:p>
+            <a:pPr>
+              <a:buFontTx/>
+              <a:buNone/>
+            </a:pPr>
+            <a:endParaRPr lang="en-US" altLang="en-US" sz="2400" smtClean="0"/>
+          </a:p>
+        </p:txBody>
+      </p:sp>
+      <p:sp>
+        <p:nvSpPr>
+          <p:cNvPr id="6" name="Text Box 8"/>
+          <p:cNvSpPr txBox="1">
+            <a:spLocks noChangeArrowheads="1"/>
+          </p:cNvSpPr>
+          <p:nvPr/>
+        </p:nvSpPr>
+        <p:spPr bwMode="auto">
+          <a:xfrm>
+            <a:off x="2372711" y="4146331"/>
+            <a:ext cx="2667000" cy="731838"/>
+          </a:xfrm>
+          <a:prstGeom prst="rect">
+            <a:avLst/>
+          </a:prstGeom>
+          <a:noFill/>
+          <a:ln>
+            <a:noFill/>
+          </a:ln>
+          <a:extLst>
+            <a:ext uri="{909E8E84-426E-40DD-AFC4-6F175D3DCCD1}">
+              <a14:hiddenFill xmlns:a14="http://schemas.microsoft.com/office/drawing/2010/main">
+                <a:solidFill>
+                  <a:srgbClr val="FFFFFF"/>
+                </a:solidFill>
+              </a14:hiddenFill>
+            </a:ext>
+            <a:ext uri="{91240B29-F687-4F45-9708-019B960494DF}">
+              <a14:hiddenLine xmlns:a14="http://schemas.microsoft.com/office/drawing/2010/main" w="9525">
+                <a:solidFill>
+                  <a:srgbClr val="000000"/>
+                </a:solidFill>
+                <a:miter lim="800000"/>
+                <a:headEnd/>
+                <a:tailEnd/>
+              </a14:hiddenLine>
+            </a:ext>
+          </a:extLst>
+        </p:spPr>
+        <p:txBody>
+          <a:bodyPr>
+            <a:spAutoFit/>
+          </a:bodyPr>
+          <a:lstStyle>
+            <a:lvl1pPr>
+              <a:spcBef>
+                <a:spcPct val="20000"/>
+              </a:spcBef>
+              <a:buChar char="•"/>
+              <a:defRPr sz="2800">
+                <a:solidFill>
+                  <a:schemeClr val="tx1"/>
+                </a:solidFill>
+                <a:latin typeface="Times New Roman" panose="02020603050405020304" pitchFamily="18" charset="0"/>
+              </a:defRPr>
+            </a:lvl1pPr>
+            <a:lvl2pPr marL="742950" indent="-285750">
+              <a:spcBef>
+                <a:spcPct val="20000"/>
+              </a:spcBef>
+              <a:buChar char="–"/>
+              <a:defRPr sz="2200">
+                <a:solidFill>
+                  <a:schemeClr val="tx1"/>
+                </a:solidFill>
+                <a:latin typeface="Times New Roman" panose="02020603050405020304" pitchFamily="18" charset="0"/>
+              </a:defRPr>
+            </a:lvl2pPr>
+            <a:lvl3pPr marL="1143000" indent="-228600">
+              <a:spcBef>
+                <a:spcPct val="20000"/>
+              </a:spcBef>
+              <a:buChar char="•"/>
+              <a:defRPr sz="2000">
+                <a:solidFill>
+                  <a:schemeClr val="tx1"/>
+                </a:solidFill>
+                <a:latin typeface="Times New Roman" panose="02020603050405020304" pitchFamily="18" charset="0"/>
+              </a:defRPr>
+            </a:lvl3pPr>
+            <a:lvl4pPr marL="1600200" indent="-228600">
+              <a:spcBef>
+                <a:spcPct val="20000"/>
+              </a:spcBef>
+              <a:buChar char="–"/>
+              <a:defRPr sz="2000">
+                <a:solidFill>
+                  <a:schemeClr val="tx1"/>
+                </a:solidFill>
+                <a:latin typeface="Times New Roman" panose="02020603050405020304" pitchFamily="18" charset="0"/>
+              </a:defRPr>
+            </a:lvl4pPr>
+            <a:lvl5pPr marL="2057400" indent="-228600">
+              <a:spcBef>
+                <a:spcPct val="20000"/>
+              </a:spcBef>
+              <a:buChar char="»"/>
+              <a:defRPr sz="2000">
+                <a:solidFill>
+                  <a:schemeClr val="tx1"/>
+                </a:solidFill>
+                <a:latin typeface="Times New Roman" panose="02020603050405020304" pitchFamily="18" charset="0"/>
+              </a:defRPr>
+            </a:lvl5pPr>
+            <a:lvl6pPr marL="2514600" indent="-228600" eaLnBrk="0" fontAlgn="base" hangingPunct="0">
+              <a:spcBef>
+                <a:spcPct val="20000"/>
+              </a:spcBef>
+              <a:spcAft>
+                <a:spcPct val="0"/>
+              </a:spcAft>
+              <a:buChar char="»"/>
+              <a:defRPr sz="2000">
+                <a:solidFill>
+                  <a:schemeClr val="tx1"/>
+                </a:solidFill>
+                <a:latin typeface="Times New Roman" panose="02020603050405020304" pitchFamily="18" charset="0"/>
+              </a:defRPr>
+            </a:lvl6pPr>
+            <a:lvl7pPr marL="2971800" indent="-228600" eaLnBrk="0" fontAlgn="base" hangingPunct="0">
+              <a:spcBef>
+                <a:spcPct val="20000"/>
+              </a:spcBef>
+              <a:spcAft>
+                <a:spcPct val="0"/>
+              </a:spcAft>
+              <a:buChar char="»"/>
+              <a:defRPr sz="2000">
+                <a:solidFill>
+                  <a:schemeClr val="tx1"/>
+                </a:solidFill>
+                <a:latin typeface="Times New Roman" panose="02020603050405020304" pitchFamily="18" charset="0"/>
+              </a:defRPr>
+            </a:lvl7pPr>
+            <a:lvl8pPr marL="3429000" indent="-228600" eaLnBrk="0" fontAlgn="base" hangingPunct="0">
+              <a:spcBef>
+                <a:spcPct val="20000"/>
+              </a:spcBef>
+              <a:spcAft>
+                <a:spcPct val="0"/>
+              </a:spcAft>
+              <a:buChar char="»"/>
+              <a:defRPr sz="2000">
+                <a:solidFill>
+                  <a:schemeClr val="tx1"/>
+                </a:solidFill>
+                <a:latin typeface="Times New Roman" panose="02020603050405020304" pitchFamily="18" charset="0"/>
+              </a:defRPr>
+            </a:lvl8pPr>
+            <a:lvl9pPr marL="3886200" indent="-228600" eaLnBrk="0" fontAlgn="base" hangingPunct="0">
+              <a:spcBef>
+                <a:spcPct val="20000"/>
+              </a:spcBef>
+              <a:spcAft>
+                <a:spcPct val="0"/>
+              </a:spcAft>
+              <a:buChar char="»"/>
+              <a:defRPr sz="2000">
+                <a:solidFill>
+                  <a:schemeClr val="tx1"/>
+                </a:solidFill>
+                <a:latin typeface="Times New Roman" panose="02020603050405020304" pitchFamily="18" charset="0"/>
+              </a:defRPr>
+            </a:lvl9pPr>
+          </a:lstStyle>
+          <a:p>
+            <a:pPr>
+              <a:spcBef>
+                <a:spcPct val="50000"/>
+              </a:spcBef>
+              <a:buFontTx/>
+              <a:buNone/>
+            </a:pPr>
+            <a:r>
+              <a:rPr lang="en-US" altLang="en-US" sz="1600"/>
+              <a:t>service</a:t>
+            </a:r>
+            <a:r>
+              <a:rPr lang="en-US" altLang="en-US" sz="1800"/>
+              <a:t>(ServletRequest, </a:t>
+            </a:r>
+          </a:p>
+          <a:p>
+            <a:pPr>
+              <a:spcBef>
+                <a:spcPct val="50000"/>
+              </a:spcBef>
+              <a:buFontTx/>
+              <a:buNone/>
+            </a:pPr>
+            <a:r>
+              <a:rPr lang="en-US" altLang="en-US" sz="1800"/>
+              <a:t>              ServletResponse);</a:t>
+            </a:r>
+          </a:p>
+        </p:txBody>
+      </p:sp>
+      <p:sp>
+        <p:nvSpPr>
+          <p:cNvPr id="7" name="Text Box 9"/>
+          <p:cNvSpPr txBox="1">
+            <a:spLocks noChangeArrowheads="1"/>
+          </p:cNvSpPr>
+          <p:nvPr/>
+        </p:nvSpPr>
+        <p:spPr bwMode="auto">
+          <a:xfrm>
+            <a:off x="2448911" y="5365531"/>
+            <a:ext cx="1073150" cy="731838"/>
+          </a:xfrm>
+          <a:prstGeom prst="rect">
+            <a:avLst/>
+          </a:prstGeom>
+          <a:noFill/>
+          <a:ln>
+            <a:noFill/>
+          </a:ln>
+          <a:extLst>
+            <a:ext uri="{909E8E84-426E-40DD-AFC4-6F175D3DCCD1}">
+              <a14:hiddenFill xmlns:a14="http://schemas.microsoft.com/office/drawing/2010/main">
+                <a:solidFill>
+                  <a:srgbClr val="FFFFFF"/>
+                </a:solidFill>
+              </a14:hiddenFill>
+            </a:ext>
+            <a:ext uri="{91240B29-F687-4F45-9708-019B960494DF}">
+              <a14:hiddenLine xmlns:a14="http://schemas.microsoft.com/office/drawing/2010/main" w="9525">
+                <a:solidFill>
+                  <a:srgbClr val="000000"/>
+                </a:solidFill>
+                <a:miter lim="800000"/>
+                <a:headEnd/>
+                <a:tailEnd/>
+              </a14:hiddenLine>
+            </a:ext>
+          </a:extLst>
+        </p:spPr>
+        <p:txBody>
+          <a:bodyPr wrap="none">
+            <a:spAutoFit/>
+          </a:bodyPr>
+          <a:lstStyle>
+            <a:lvl1pPr>
+              <a:spcBef>
+                <a:spcPct val="20000"/>
+              </a:spcBef>
+              <a:buChar char="•"/>
+              <a:defRPr sz="2800">
+                <a:solidFill>
+                  <a:schemeClr val="tx1"/>
+                </a:solidFill>
+                <a:latin typeface="Times New Roman" panose="02020603050405020304" pitchFamily="18" charset="0"/>
+              </a:defRPr>
+            </a:lvl1pPr>
+            <a:lvl2pPr marL="742950" indent="-285750">
+              <a:spcBef>
+                <a:spcPct val="20000"/>
+              </a:spcBef>
+              <a:buChar char="–"/>
+              <a:defRPr sz="2200">
+                <a:solidFill>
+                  <a:schemeClr val="tx1"/>
+                </a:solidFill>
+                <a:latin typeface="Times New Roman" panose="02020603050405020304" pitchFamily="18" charset="0"/>
+              </a:defRPr>
+            </a:lvl2pPr>
+            <a:lvl3pPr marL="1143000" indent="-228600">
+              <a:spcBef>
+                <a:spcPct val="20000"/>
+              </a:spcBef>
+              <a:buChar char="•"/>
+              <a:defRPr sz="2000">
+                <a:solidFill>
+                  <a:schemeClr val="tx1"/>
+                </a:solidFill>
+                <a:latin typeface="Times New Roman" panose="02020603050405020304" pitchFamily="18" charset="0"/>
+              </a:defRPr>
+            </a:lvl3pPr>
+            <a:lvl4pPr marL="1600200" indent="-228600">
+              <a:spcBef>
+                <a:spcPct val="20000"/>
+              </a:spcBef>
+              <a:buChar char="–"/>
+              <a:defRPr sz="2000">
+                <a:solidFill>
+                  <a:schemeClr val="tx1"/>
+                </a:solidFill>
+                <a:latin typeface="Times New Roman" panose="02020603050405020304" pitchFamily="18" charset="0"/>
+              </a:defRPr>
+            </a:lvl4pPr>
+            <a:lvl5pPr marL="2057400" indent="-228600">
+              <a:spcBef>
+                <a:spcPct val="20000"/>
+              </a:spcBef>
+              <a:buChar char="»"/>
+              <a:defRPr sz="2000">
+                <a:solidFill>
+                  <a:schemeClr val="tx1"/>
+                </a:solidFill>
+                <a:latin typeface="Times New Roman" panose="02020603050405020304" pitchFamily="18" charset="0"/>
+              </a:defRPr>
+            </a:lvl5pPr>
+            <a:lvl6pPr marL="2514600" indent="-228600" eaLnBrk="0" fontAlgn="base" hangingPunct="0">
+              <a:spcBef>
+                <a:spcPct val="20000"/>
+              </a:spcBef>
+              <a:spcAft>
+                <a:spcPct val="0"/>
+              </a:spcAft>
+              <a:buChar char="»"/>
+              <a:defRPr sz="2000">
+                <a:solidFill>
+                  <a:schemeClr val="tx1"/>
+                </a:solidFill>
+                <a:latin typeface="Times New Roman" panose="02020603050405020304" pitchFamily="18" charset="0"/>
+              </a:defRPr>
+            </a:lvl6pPr>
+            <a:lvl7pPr marL="2971800" indent="-228600" eaLnBrk="0" fontAlgn="base" hangingPunct="0">
+              <a:spcBef>
+                <a:spcPct val="20000"/>
+              </a:spcBef>
+              <a:spcAft>
+                <a:spcPct val="0"/>
+              </a:spcAft>
+              <a:buChar char="»"/>
+              <a:defRPr sz="2000">
+                <a:solidFill>
+                  <a:schemeClr val="tx1"/>
+                </a:solidFill>
+                <a:latin typeface="Times New Roman" panose="02020603050405020304" pitchFamily="18" charset="0"/>
+              </a:defRPr>
+            </a:lvl7pPr>
+            <a:lvl8pPr marL="3429000" indent="-228600" eaLnBrk="0" fontAlgn="base" hangingPunct="0">
+              <a:spcBef>
+                <a:spcPct val="20000"/>
+              </a:spcBef>
+              <a:spcAft>
+                <a:spcPct val="0"/>
+              </a:spcAft>
+              <a:buChar char="»"/>
+              <a:defRPr sz="2000">
+                <a:solidFill>
+                  <a:schemeClr val="tx1"/>
+                </a:solidFill>
+                <a:latin typeface="Times New Roman" panose="02020603050405020304" pitchFamily="18" charset="0"/>
+              </a:defRPr>
+            </a:lvl8pPr>
+            <a:lvl9pPr marL="3886200" indent="-228600" eaLnBrk="0" fontAlgn="base" hangingPunct="0">
+              <a:spcBef>
+                <a:spcPct val="20000"/>
+              </a:spcBef>
+              <a:spcAft>
+                <a:spcPct val="0"/>
+              </a:spcAft>
+              <a:buChar char="»"/>
+              <a:defRPr sz="2000">
+                <a:solidFill>
+                  <a:schemeClr val="tx1"/>
+                </a:solidFill>
+                <a:latin typeface="Times New Roman" panose="02020603050405020304" pitchFamily="18" charset="0"/>
+              </a:defRPr>
+            </a:lvl9pPr>
+          </a:lstStyle>
+          <a:p>
+            <a:pPr>
+              <a:spcBef>
+                <a:spcPct val="50000"/>
+              </a:spcBef>
+              <a:buFontTx/>
+              <a:buNone/>
+            </a:pPr>
+            <a:r>
+              <a:rPr lang="en-US" altLang="en-US" sz="1800"/>
+              <a:t>destroy();</a:t>
+            </a:r>
+          </a:p>
+          <a:p>
+            <a:pPr>
+              <a:spcBef>
+                <a:spcPct val="50000"/>
+              </a:spcBef>
+              <a:buFontTx/>
+              <a:buNone/>
+            </a:pPr>
+            <a:endParaRPr lang="en-US" altLang="en-US" sz="1600"/>
+          </a:p>
+        </p:txBody>
+      </p:sp>
+      <p:sp>
+        <p:nvSpPr>
+          <p:cNvPr id="8" name="Text Box 10"/>
+          <p:cNvSpPr txBox="1">
+            <a:spLocks noChangeArrowheads="1"/>
+          </p:cNvSpPr>
+          <p:nvPr/>
+        </p:nvSpPr>
+        <p:spPr bwMode="auto">
+          <a:xfrm>
+            <a:off x="3058511" y="1479331"/>
+            <a:ext cx="1066800" cy="466725"/>
+          </a:xfrm>
+          <a:prstGeom prst="rect">
+            <a:avLst/>
+          </a:prstGeom>
+          <a:noFill/>
+          <a:ln w="9525">
+            <a:solidFill>
+              <a:schemeClr val="tx1"/>
+            </a:solidFill>
+            <a:miter lim="800000"/>
+            <a:headEnd/>
+            <a:tailEnd/>
+          </a:ln>
+          <a:extLst>
+            <a:ext uri="{909E8E84-426E-40DD-AFC4-6F175D3DCCD1}">
+              <a14:hiddenFill xmlns:a14="http://schemas.microsoft.com/office/drawing/2010/main">
+                <a:solidFill>
+                  <a:srgbClr val="FFFFFF"/>
+                </a:solidFill>
+              </a14:hiddenFill>
+            </a:ext>
+          </a:extLst>
+        </p:spPr>
+        <p:txBody>
+          <a:bodyPr>
+            <a:spAutoFit/>
+          </a:bodyPr>
+          <a:lstStyle>
+            <a:lvl1pPr>
+              <a:spcBef>
+                <a:spcPct val="20000"/>
+              </a:spcBef>
+              <a:buChar char="•"/>
+              <a:defRPr sz="2800">
+                <a:solidFill>
+                  <a:schemeClr val="tx1"/>
+                </a:solidFill>
+                <a:latin typeface="Times New Roman" panose="02020603050405020304" pitchFamily="18" charset="0"/>
+              </a:defRPr>
+            </a:lvl1pPr>
+            <a:lvl2pPr marL="742950" indent="-285750">
+              <a:spcBef>
+                <a:spcPct val="20000"/>
+              </a:spcBef>
+              <a:buChar char="–"/>
+              <a:defRPr sz="2200">
+                <a:solidFill>
+                  <a:schemeClr val="tx1"/>
+                </a:solidFill>
+                <a:latin typeface="Times New Roman" panose="02020603050405020304" pitchFamily="18" charset="0"/>
+              </a:defRPr>
+            </a:lvl2pPr>
+            <a:lvl3pPr marL="1143000" indent="-228600">
+              <a:spcBef>
+                <a:spcPct val="20000"/>
+              </a:spcBef>
+              <a:buChar char="•"/>
+              <a:defRPr sz="2000">
+                <a:solidFill>
+                  <a:schemeClr val="tx1"/>
+                </a:solidFill>
+                <a:latin typeface="Times New Roman" panose="02020603050405020304" pitchFamily="18" charset="0"/>
+              </a:defRPr>
+            </a:lvl3pPr>
+            <a:lvl4pPr marL="1600200" indent="-228600">
+              <a:spcBef>
+                <a:spcPct val="20000"/>
+              </a:spcBef>
+              <a:buChar char="–"/>
+              <a:defRPr sz="2000">
+                <a:solidFill>
+                  <a:schemeClr val="tx1"/>
+                </a:solidFill>
+                <a:latin typeface="Times New Roman" panose="02020603050405020304" pitchFamily="18" charset="0"/>
+              </a:defRPr>
+            </a:lvl4pPr>
+            <a:lvl5pPr marL="2057400" indent="-228600">
+              <a:spcBef>
+                <a:spcPct val="20000"/>
+              </a:spcBef>
+              <a:buChar char="»"/>
+              <a:defRPr sz="2000">
+                <a:solidFill>
+                  <a:schemeClr val="tx1"/>
+                </a:solidFill>
+                <a:latin typeface="Times New Roman" panose="02020603050405020304" pitchFamily="18" charset="0"/>
+              </a:defRPr>
+            </a:lvl5pPr>
+            <a:lvl6pPr marL="2514600" indent="-228600" eaLnBrk="0" fontAlgn="base" hangingPunct="0">
+              <a:spcBef>
+                <a:spcPct val="20000"/>
+              </a:spcBef>
+              <a:spcAft>
+                <a:spcPct val="0"/>
+              </a:spcAft>
+              <a:buChar char="»"/>
+              <a:defRPr sz="2000">
+                <a:solidFill>
+                  <a:schemeClr val="tx1"/>
+                </a:solidFill>
+                <a:latin typeface="Times New Roman" panose="02020603050405020304" pitchFamily="18" charset="0"/>
+              </a:defRPr>
+            </a:lvl6pPr>
+            <a:lvl7pPr marL="2971800" indent="-228600" eaLnBrk="0" fontAlgn="base" hangingPunct="0">
+              <a:spcBef>
+                <a:spcPct val="20000"/>
+              </a:spcBef>
+              <a:spcAft>
+                <a:spcPct val="0"/>
+              </a:spcAft>
+              <a:buChar char="»"/>
+              <a:defRPr sz="2000">
+                <a:solidFill>
+                  <a:schemeClr val="tx1"/>
+                </a:solidFill>
+                <a:latin typeface="Times New Roman" panose="02020603050405020304" pitchFamily="18" charset="0"/>
+              </a:defRPr>
+            </a:lvl7pPr>
+            <a:lvl8pPr marL="3429000" indent="-228600" eaLnBrk="0" fontAlgn="base" hangingPunct="0">
+              <a:spcBef>
+                <a:spcPct val="20000"/>
+              </a:spcBef>
+              <a:spcAft>
+                <a:spcPct val="0"/>
+              </a:spcAft>
+              <a:buChar char="»"/>
+              <a:defRPr sz="2000">
+                <a:solidFill>
+                  <a:schemeClr val="tx1"/>
+                </a:solidFill>
+                <a:latin typeface="Times New Roman" panose="02020603050405020304" pitchFamily="18" charset="0"/>
+              </a:defRPr>
+            </a:lvl8pPr>
+            <a:lvl9pPr marL="3886200" indent="-228600" eaLnBrk="0" fontAlgn="base" hangingPunct="0">
+              <a:spcBef>
+                <a:spcPct val="20000"/>
+              </a:spcBef>
+              <a:spcAft>
+                <a:spcPct val="0"/>
+              </a:spcAft>
+              <a:buChar char="»"/>
+              <a:defRPr sz="2000">
+                <a:solidFill>
+                  <a:schemeClr val="tx1"/>
+                </a:solidFill>
+                <a:latin typeface="Times New Roman" panose="02020603050405020304" pitchFamily="18" charset="0"/>
+              </a:defRPr>
+            </a:lvl9pPr>
+          </a:lstStyle>
+          <a:p>
+            <a:pPr>
+              <a:spcBef>
+                <a:spcPct val="50000"/>
+              </a:spcBef>
+              <a:buFontTx/>
+              <a:buNone/>
+            </a:pPr>
+            <a:r>
+              <a:rPr lang="en-US" altLang="en-US" sz="1600"/>
+              <a:t>servlet</a:t>
+            </a:r>
+          </a:p>
+        </p:txBody>
+      </p:sp>
+      <p:sp>
+        <p:nvSpPr>
+          <p:cNvPr id="9" name="Text Box 11"/>
+          <p:cNvSpPr txBox="1">
+            <a:spLocks noChangeArrowheads="1"/>
+          </p:cNvSpPr>
+          <p:nvPr/>
+        </p:nvSpPr>
+        <p:spPr bwMode="auto">
+          <a:xfrm>
+            <a:off x="2601311" y="2393731"/>
+            <a:ext cx="2057400" cy="466725"/>
+          </a:xfrm>
+          <a:prstGeom prst="rect">
+            <a:avLst/>
+          </a:prstGeom>
+          <a:noFill/>
+          <a:ln w="9525">
+            <a:solidFill>
+              <a:schemeClr val="tx1"/>
+            </a:solidFill>
+            <a:miter lim="800000"/>
+            <a:headEnd/>
+            <a:tailEnd/>
+          </a:ln>
+          <a:extLst>
+            <a:ext uri="{909E8E84-426E-40DD-AFC4-6F175D3DCCD1}">
+              <a14:hiddenFill xmlns:a14="http://schemas.microsoft.com/office/drawing/2010/main">
+                <a:solidFill>
+                  <a:srgbClr val="FFFFFF"/>
+                </a:solidFill>
+              </a14:hiddenFill>
+            </a:ext>
+          </a:extLst>
+        </p:spPr>
+        <p:txBody>
+          <a:bodyPr>
+            <a:spAutoFit/>
+          </a:bodyPr>
+          <a:lstStyle>
+            <a:lvl1pPr>
+              <a:spcBef>
+                <a:spcPct val="20000"/>
+              </a:spcBef>
+              <a:buChar char="•"/>
+              <a:defRPr sz="2800">
+                <a:solidFill>
+                  <a:schemeClr val="tx1"/>
+                </a:solidFill>
+                <a:latin typeface="Times New Roman" panose="02020603050405020304" pitchFamily="18" charset="0"/>
+              </a:defRPr>
+            </a:lvl1pPr>
+            <a:lvl2pPr marL="742950" indent="-285750">
+              <a:spcBef>
+                <a:spcPct val="20000"/>
+              </a:spcBef>
+              <a:buChar char="–"/>
+              <a:defRPr sz="2200">
+                <a:solidFill>
+                  <a:schemeClr val="tx1"/>
+                </a:solidFill>
+                <a:latin typeface="Times New Roman" panose="02020603050405020304" pitchFamily="18" charset="0"/>
+              </a:defRPr>
+            </a:lvl2pPr>
+            <a:lvl3pPr marL="1143000" indent="-228600">
+              <a:spcBef>
+                <a:spcPct val="20000"/>
+              </a:spcBef>
+              <a:buChar char="•"/>
+              <a:defRPr sz="2000">
+                <a:solidFill>
+                  <a:schemeClr val="tx1"/>
+                </a:solidFill>
+                <a:latin typeface="Times New Roman" panose="02020603050405020304" pitchFamily="18" charset="0"/>
+              </a:defRPr>
+            </a:lvl3pPr>
+            <a:lvl4pPr marL="1600200" indent="-228600">
+              <a:spcBef>
+                <a:spcPct val="20000"/>
+              </a:spcBef>
+              <a:buChar char="–"/>
+              <a:defRPr sz="2000">
+                <a:solidFill>
+                  <a:schemeClr val="tx1"/>
+                </a:solidFill>
+                <a:latin typeface="Times New Roman" panose="02020603050405020304" pitchFamily="18" charset="0"/>
+              </a:defRPr>
+            </a:lvl4pPr>
+            <a:lvl5pPr marL="2057400" indent="-228600">
+              <a:spcBef>
+                <a:spcPct val="20000"/>
+              </a:spcBef>
+              <a:buChar char="»"/>
+              <a:defRPr sz="2000">
+                <a:solidFill>
+                  <a:schemeClr val="tx1"/>
+                </a:solidFill>
+                <a:latin typeface="Times New Roman" panose="02020603050405020304" pitchFamily="18" charset="0"/>
+              </a:defRPr>
+            </a:lvl5pPr>
+            <a:lvl6pPr marL="2514600" indent="-228600" eaLnBrk="0" fontAlgn="base" hangingPunct="0">
+              <a:spcBef>
+                <a:spcPct val="20000"/>
+              </a:spcBef>
+              <a:spcAft>
+                <a:spcPct val="0"/>
+              </a:spcAft>
+              <a:buChar char="»"/>
+              <a:defRPr sz="2000">
+                <a:solidFill>
+                  <a:schemeClr val="tx1"/>
+                </a:solidFill>
+                <a:latin typeface="Times New Roman" panose="02020603050405020304" pitchFamily="18" charset="0"/>
+              </a:defRPr>
+            </a:lvl6pPr>
+            <a:lvl7pPr marL="2971800" indent="-228600" eaLnBrk="0" fontAlgn="base" hangingPunct="0">
+              <a:spcBef>
+                <a:spcPct val="20000"/>
+              </a:spcBef>
+              <a:spcAft>
+                <a:spcPct val="0"/>
+              </a:spcAft>
+              <a:buChar char="»"/>
+              <a:defRPr sz="2000">
+                <a:solidFill>
+                  <a:schemeClr val="tx1"/>
+                </a:solidFill>
+                <a:latin typeface="Times New Roman" panose="02020603050405020304" pitchFamily="18" charset="0"/>
+              </a:defRPr>
+            </a:lvl7pPr>
+            <a:lvl8pPr marL="3429000" indent="-228600" eaLnBrk="0" fontAlgn="base" hangingPunct="0">
+              <a:spcBef>
+                <a:spcPct val="20000"/>
+              </a:spcBef>
+              <a:spcAft>
+                <a:spcPct val="0"/>
+              </a:spcAft>
+              <a:buChar char="»"/>
+              <a:defRPr sz="2000">
+                <a:solidFill>
+                  <a:schemeClr val="tx1"/>
+                </a:solidFill>
+                <a:latin typeface="Times New Roman" panose="02020603050405020304" pitchFamily="18" charset="0"/>
+              </a:defRPr>
+            </a:lvl8pPr>
+            <a:lvl9pPr marL="3886200" indent="-228600" eaLnBrk="0" fontAlgn="base" hangingPunct="0">
+              <a:spcBef>
+                <a:spcPct val="20000"/>
+              </a:spcBef>
+              <a:spcAft>
+                <a:spcPct val="0"/>
+              </a:spcAft>
+              <a:buChar char="»"/>
+              <a:defRPr sz="2000">
+                <a:solidFill>
+                  <a:schemeClr val="tx1"/>
+                </a:solidFill>
+                <a:latin typeface="Times New Roman" panose="02020603050405020304" pitchFamily="18" charset="0"/>
+              </a:defRPr>
+            </a:lvl9pPr>
+          </a:lstStyle>
+          <a:p>
+            <a:pPr>
+              <a:spcBef>
+                <a:spcPct val="50000"/>
+              </a:spcBef>
+              <a:buFontTx/>
+              <a:buNone/>
+            </a:pPr>
+            <a:r>
+              <a:rPr lang="en-US" altLang="en-US" sz="1600" dirty="0" err="1"/>
+              <a:t>GenericServlet</a:t>
+            </a:r>
+            <a:endParaRPr lang="en-US" altLang="en-US" sz="1600" dirty="0"/>
+          </a:p>
+        </p:txBody>
+      </p:sp>
+      <p:sp>
+        <p:nvSpPr>
+          <p:cNvPr id="10" name="Text Box 12"/>
+          <p:cNvSpPr txBox="1">
+            <a:spLocks noChangeArrowheads="1"/>
+          </p:cNvSpPr>
+          <p:nvPr/>
+        </p:nvSpPr>
+        <p:spPr bwMode="auto">
+          <a:xfrm>
+            <a:off x="7478111" y="2317531"/>
+            <a:ext cx="1673225" cy="466725"/>
+          </a:xfrm>
+          <a:prstGeom prst="rect">
+            <a:avLst/>
+          </a:prstGeom>
+          <a:noFill/>
+          <a:ln w="9525">
+            <a:solidFill>
+              <a:schemeClr val="tx1"/>
+            </a:solidFill>
+            <a:miter lim="800000"/>
+            <a:headEnd/>
+            <a:tailEnd/>
+          </a:ln>
+          <a:extLst>
+            <a:ext uri="{909E8E84-426E-40DD-AFC4-6F175D3DCCD1}">
+              <a14:hiddenFill xmlns:a14="http://schemas.microsoft.com/office/drawing/2010/main">
+                <a:solidFill>
+                  <a:srgbClr val="FFFFFF"/>
+                </a:solidFill>
+              </a14:hiddenFill>
+            </a:ext>
+          </a:extLst>
+        </p:spPr>
+        <p:txBody>
+          <a:bodyPr>
+            <a:spAutoFit/>
+          </a:bodyPr>
+          <a:lstStyle>
+            <a:lvl1pPr>
+              <a:spcBef>
+                <a:spcPct val="20000"/>
+              </a:spcBef>
+              <a:buChar char="•"/>
+              <a:defRPr sz="2800">
+                <a:solidFill>
+                  <a:schemeClr val="tx1"/>
+                </a:solidFill>
+                <a:latin typeface="Times New Roman" panose="02020603050405020304" pitchFamily="18" charset="0"/>
+              </a:defRPr>
+            </a:lvl1pPr>
+            <a:lvl2pPr marL="742950" indent="-285750">
+              <a:spcBef>
+                <a:spcPct val="20000"/>
+              </a:spcBef>
+              <a:buChar char="–"/>
+              <a:defRPr sz="2200">
+                <a:solidFill>
+                  <a:schemeClr val="tx1"/>
+                </a:solidFill>
+                <a:latin typeface="Times New Roman" panose="02020603050405020304" pitchFamily="18" charset="0"/>
+              </a:defRPr>
+            </a:lvl2pPr>
+            <a:lvl3pPr marL="1143000" indent="-228600">
+              <a:spcBef>
+                <a:spcPct val="20000"/>
+              </a:spcBef>
+              <a:buChar char="•"/>
+              <a:defRPr sz="2000">
+                <a:solidFill>
+                  <a:schemeClr val="tx1"/>
+                </a:solidFill>
+                <a:latin typeface="Times New Roman" panose="02020603050405020304" pitchFamily="18" charset="0"/>
+              </a:defRPr>
+            </a:lvl3pPr>
+            <a:lvl4pPr marL="1600200" indent="-228600">
+              <a:spcBef>
+                <a:spcPct val="20000"/>
+              </a:spcBef>
+              <a:buChar char="–"/>
+              <a:defRPr sz="2000">
+                <a:solidFill>
+                  <a:schemeClr val="tx1"/>
+                </a:solidFill>
+                <a:latin typeface="Times New Roman" panose="02020603050405020304" pitchFamily="18" charset="0"/>
+              </a:defRPr>
+            </a:lvl4pPr>
+            <a:lvl5pPr marL="2057400" indent="-228600">
+              <a:spcBef>
+                <a:spcPct val="20000"/>
+              </a:spcBef>
+              <a:buChar char="»"/>
+              <a:defRPr sz="2000">
+                <a:solidFill>
+                  <a:schemeClr val="tx1"/>
+                </a:solidFill>
+                <a:latin typeface="Times New Roman" panose="02020603050405020304" pitchFamily="18" charset="0"/>
+              </a:defRPr>
+            </a:lvl5pPr>
+            <a:lvl6pPr marL="2514600" indent="-228600" eaLnBrk="0" fontAlgn="base" hangingPunct="0">
+              <a:spcBef>
+                <a:spcPct val="20000"/>
+              </a:spcBef>
+              <a:spcAft>
+                <a:spcPct val="0"/>
+              </a:spcAft>
+              <a:buChar char="»"/>
+              <a:defRPr sz="2000">
+                <a:solidFill>
+                  <a:schemeClr val="tx1"/>
+                </a:solidFill>
+                <a:latin typeface="Times New Roman" panose="02020603050405020304" pitchFamily="18" charset="0"/>
+              </a:defRPr>
+            </a:lvl6pPr>
+            <a:lvl7pPr marL="2971800" indent="-228600" eaLnBrk="0" fontAlgn="base" hangingPunct="0">
+              <a:spcBef>
+                <a:spcPct val="20000"/>
+              </a:spcBef>
+              <a:spcAft>
+                <a:spcPct val="0"/>
+              </a:spcAft>
+              <a:buChar char="»"/>
+              <a:defRPr sz="2000">
+                <a:solidFill>
+                  <a:schemeClr val="tx1"/>
+                </a:solidFill>
+                <a:latin typeface="Times New Roman" panose="02020603050405020304" pitchFamily="18" charset="0"/>
+              </a:defRPr>
+            </a:lvl7pPr>
+            <a:lvl8pPr marL="3429000" indent="-228600" eaLnBrk="0" fontAlgn="base" hangingPunct="0">
+              <a:spcBef>
+                <a:spcPct val="20000"/>
+              </a:spcBef>
+              <a:spcAft>
+                <a:spcPct val="0"/>
+              </a:spcAft>
+              <a:buChar char="»"/>
+              <a:defRPr sz="2000">
+                <a:solidFill>
+                  <a:schemeClr val="tx1"/>
+                </a:solidFill>
+                <a:latin typeface="Times New Roman" panose="02020603050405020304" pitchFamily="18" charset="0"/>
+              </a:defRPr>
+            </a:lvl8pPr>
+            <a:lvl9pPr marL="3886200" indent="-228600" eaLnBrk="0" fontAlgn="base" hangingPunct="0">
+              <a:spcBef>
+                <a:spcPct val="20000"/>
+              </a:spcBef>
+              <a:spcAft>
+                <a:spcPct val="0"/>
+              </a:spcAft>
+              <a:buChar char="»"/>
+              <a:defRPr sz="2000">
+                <a:solidFill>
+                  <a:schemeClr val="tx1"/>
+                </a:solidFill>
+                <a:latin typeface="Times New Roman" panose="02020603050405020304" pitchFamily="18" charset="0"/>
+              </a:defRPr>
+            </a:lvl9pPr>
+          </a:lstStyle>
+          <a:p>
+            <a:pPr>
+              <a:spcBef>
+                <a:spcPct val="50000"/>
+              </a:spcBef>
+              <a:buFontTx/>
+              <a:buNone/>
+            </a:pPr>
+            <a:r>
+              <a:rPr lang="en-US" altLang="en-US" sz="1600"/>
+              <a:t>HttpServlet</a:t>
+            </a:r>
+          </a:p>
+        </p:txBody>
+      </p:sp>
+      <p:sp>
+        <p:nvSpPr>
+          <p:cNvPr id="11" name="AutoShape 13"/>
+          <p:cNvSpPr>
+            <a:spLocks noChangeArrowheads="1"/>
+          </p:cNvSpPr>
+          <p:nvPr/>
+        </p:nvSpPr>
+        <p:spPr bwMode="auto">
+          <a:xfrm>
+            <a:off x="3401411" y="1936531"/>
+            <a:ext cx="266700" cy="190500"/>
+          </a:xfrm>
+          <a:prstGeom prst="flowChartExtract">
+            <a:avLst/>
+          </a:prstGeom>
+          <a:solidFill>
+            <a:schemeClr val="accent1"/>
+          </a:solidFill>
+          <a:ln w="9525">
+            <a:solidFill>
+              <a:schemeClr val="tx1"/>
+            </a:solidFill>
+            <a:miter lim="800000"/>
+            <a:headEnd/>
+            <a:tailEnd/>
+          </a:ln>
+        </p:spPr>
+        <p:txBody>
+          <a:bodyPr wrap="none" anchor="ctr"/>
+          <a:lstStyle>
+            <a:lvl1pPr>
+              <a:spcBef>
+                <a:spcPct val="20000"/>
+              </a:spcBef>
+              <a:buChar char="•"/>
+              <a:defRPr sz="2800">
+                <a:solidFill>
+                  <a:schemeClr val="tx1"/>
+                </a:solidFill>
+                <a:latin typeface="Times New Roman" panose="02020603050405020304" pitchFamily="18" charset="0"/>
+              </a:defRPr>
+            </a:lvl1pPr>
+            <a:lvl2pPr marL="742950" indent="-285750">
+              <a:spcBef>
+                <a:spcPct val="20000"/>
+              </a:spcBef>
+              <a:buChar char="–"/>
+              <a:defRPr sz="2200">
+                <a:solidFill>
+                  <a:schemeClr val="tx1"/>
+                </a:solidFill>
+                <a:latin typeface="Times New Roman" panose="02020603050405020304" pitchFamily="18" charset="0"/>
+              </a:defRPr>
+            </a:lvl2pPr>
+            <a:lvl3pPr marL="1143000" indent="-228600">
+              <a:spcBef>
+                <a:spcPct val="20000"/>
+              </a:spcBef>
+              <a:buChar char="•"/>
+              <a:defRPr sz="2000">
+                <a:solidFill>
+                  <a:schemeClr val="tx1"/>
+                </a:solidFill>
+                <a:latin typeface="Times New Roman" panose="02020603050405020304" pitchFamily="18" charset="0"/>
+              </a:defRPr>
+            </a:lvl3pPr>
+            <a:lvl4pPr marL="1600200" indent="-228600">
+              <a:spcBef>
+                <a:spcPct val="20000"/>
+              </a:spcBef>
+              <a:buChar char="–"/>
+              <a:defRPr sz="2000">
+                <a:solidFill>
+                  <a:schemeClr val="tx1"/>
+                </a:solidFill>
+                <a:latin typeface="Times New Roman" panose="02020603050405020304" pitchFamily="18" charset="0"/>
+              </a:defRPr>
+            </a:lvl4pPr>
+            <a:lvl5pPr marL="2057400" indent="-228600">
+              <a:spcBef>
+                <a:spcPct val="20000"/>
+              </a:spcBef>
+              <a:buChar char="»"/>
+              <a:defRPr sz="2000">
+                <a:solidFill>
+                  <a:schemeClr val="tx1"/>
+                </a:solidFill>
+                <a:latin typeface="Times New Roman" panose="02020603050405020304" pitchFamily="18" charset="0"/>
+              </a:defRPr>
+            </a:lvl5pPr>
+            <a:lvl6pPr marL="2514600" indent="-228600" eaLnBrk="0" fontAlgn="base" hangingPunct="0">
+              <a:spcBef>
+                <a:spcPct val="20000"/>
+              </a:spcBef>
+              <a:spcAft>
+                <a:spcPct val="0"/>
+              </a:spcAft>
+              <a:buChar char="»"/>
+              <a:defRPr sz="2000">
+                <a:solidFill>
+                  <a:schemeClr val="tx1"/>
+                </a:solidFill>
+                <a:latin typeface="Times New Roman" panose="02020603050405020304" pitchFamily="18" charset="0"/>
+              </a:defRPr>
+            </a:lvl6pPr>
+            <a:lvl7pPr marL="2971800" indent="-228600" eaLnBrk="0" fontAlgn="base" hangingPunct="0">
+              <a:spcBef>
+                <a:spcPct val="20000"/>
+              </a:spcBef>
+              <a:spcAft>
+                <a:spcPct val="0"/>
+              </a:spcAft>
+              <a:buChar char="»"/>
+              <a:defRPr sz="2000">
+                <a:solidFill>
+                  <a:schemeClr val="tx1"/>
+                </a:solidFill>
+                <a:latin typeface="Times New Roman" panose="02020603050405020304" pitchFamily="18" charset="0"/>
+              </a:defRPr>
+            </a:lvl7pPr>
+            <a:lvl8pPr marL="3429000" indent="-228600" eaLnBrk="0" fontAlgn="base" hangingPunct="0">
+              <a:spcBef>
+                <a:spcPct val="20000"/>
+              </a:spcBef>
+              <a:spcAft>
+                <a:spcPct val="0"/>
+              </a:spcAft>
+              <a:buChar char="»"/>
+              <a:defRPr sz="2000">
+                <a:solidFill>
+                  <a:schemeClr val="tx1"/>
+                </a:solidFill>
+                <a:latin typeface="Times New Roman" panose="02020603050405020304" pitchFamily="18" charset="0"/>
+              </a:defRPr>
+            </a:lvl8pPr>
+            <a:lvl9pPr marL="3886200" indent="-228600" eaLnBrk="0" fontAlgn="base" hangingPunct="0">
+              <a:spcBef>
+                <a:spcPct val="20000"/>
+              </a:spcBef>
+              <a:spcAft>
+                <a:spcPct val="0"/>
+              </a:spcAft>
+              <a:buChar char="»"/>
+              <a:defRPr sz="2000">
+                <a:solidFill>
+                  <a:schemeClr val="tx1"/>
+                </a:solidFill>
+                <a:latin typeface="Times New Roman" panose="02020603050405020304" pitchFamily="18" charset="0"/>
+              </a:defRPr>
+            </a:lvl9pPr>
+          </a:lstStyle>
+          <a:p>
+            <a:pPr>
+              <a:spcBef>
+                <a:spcPct val="50000"/>
+              </a:spcBef>
+              <a:buFontTx/>
+              <a:buNone/>
+            </a:pPr>
+            <a:endParaRPr lang="en-US" altLang="en-US" sz="1600"/>
+          </a:p>
+        </p:txBody>
+      </p:sp>
+      <p:sp>
+        <p:nvSpPr>
+          <p:cNvPr id="12" name="AutoShape 14"/>
+          <p:cNvSpPr>
+            <a:spLocks noChangeArrowheads="1"/>
+          </p:cNvSpPr>
+          <p:nvPr/>
+        </p:nvSpPr>
+        <p:spPr bwMode="auto">
+          <a:xfrm rot="16200000">
+            <a:off x="4658711" y="2469931"/>
+            <a:ext cx="228600" cy="228600"/>
+          </a:xfrm>
+          <a:prstGeom prst="flowChartExtract">
+            <a:avLst/>
+          </a:prstGeom>
+          <a:solidFill>
+            <a:schemeClr val="accent1"/>
+          </a:solidFill>
+          <a:ln w="9525">
+            <a:solidFill>
+              <a:schemeClr val="tx1"/>
+            </a:solidFill>
+            <a:miter lim="800000"/>
+            <a:headEnd/>
+            <a:tailEnd/>
+          </a:ln>
+        </p:spPr>
+        <p:txBody>
+          <a:bodyPr wrap="none" anchor="ctr"/>
+          <a:lstStyle>
+            <a:lvl1pPr>
+              <a:spcBef>
+                <a:spcPct val="20000"/>
+              </a:spcBef>
+              <a:buChar char="•"/>
+              <a:defRPr sz="2800">
+                <a:solidFill>
+                  <a:schemeClr val="tx1"/>
+                </a:solidFill>
+                <a:latin typeface="Times New Roman" panose="02020603050405020304" pitchFamily="18" charset="0"/>
+              </a:defRPr>
+            </a:lvl1pPr>
+            <a:lvl2pPr marL="742950" indent="-285750">
+              <a:spcBef>
+                <a:spcPct val="20000"/>
+              </a:spcBef>
+              <a:buChar char="–"/>
+              <a:defRPr sz="2200">
+                <a:solidFill>
+                  <a:schemeClr val="tx1"/>
+                </a:solidFill>
+                <a:latin typeface="Times New Roman" panose="02020603050405020304" pitchFamily="18" charset="0"/>
+              </a:defRPr>
+            </a:lvl2pPr>
+            <a:lvl3pPr marL="1143000" indent="-228600">
+              <a:spcBef>
+                <a:spcPct val="20000"/>
+              </a:spcBef>
+              <a:buChar char="•"/>
+              <a:defRPr sz="2000">
+                <a:solidFill>
+                  <a:schemeClr val="tx1"/>
+                </a:solidFill>
+                <a:latin typeface="Times New Roman" panose="02020603050405020304" pitchFamily="18" charset="0"/>
+              </a:defRPr>
+            </a:lvl3pPr>
+            <a:lvl4pPr marL="1600200" indent="-228600">
+              <a:spcBef>
+                <a:spcPct val="20000"/>
+              </a:spcBef>
+              <a:buChar char="–"/>
+              <a:defRPr sz="2000">
+                <a:solidFill>
+                  <a:schemeClr val="tx1"/>
+                </a:solidFill>
+                <a:latin typeface="Times New Roman" panose="02020603050405020304" pitchFamily="18" charset="0"/>
+              </a:defRPr>
+            </a:lvl4pPr>
+            <a:lvl5pPr marL="2057400" indent="-228600">
+              <a:spcBef>
+                <a:spcPct val="20000"/>
+              </a:spcBef>
+              <a:buChar char="»"/>
+              <a:defRPr sz="2000">
+                <a:solidFill>
+                  <a:schemeClr val="tx1"/>
+                </a:solidFill>
+                <a:latin typeface="Times New Roman" panose="02020603050405020304" pitchFamily="18" charset="0"/>
+              </a:defRPr>
+            </a:lvl5pPr>
+            <a:lvl6pPr marL="2514600" indent="-228600" eaLnBrk="0" fontAlgn="base" hangingPunct="0">
+              <a:spcBef>
+                <a:spcPct val="20000"/>
+              </a:spcBef>
+              <a:spcAft>
+                <a:spcPct val="0"/>
+              </a:spcAft>
+              <a:buChar char="»"/>
+              <a:defRPr sz="2000">
+                <a:solidFill>
+                  <a:schemeClr val="tx1"/>
+                </a:solidFill>
+                <a:latin typeface="Times New Roman" panose="02020603050405020304" pitchFamily="18" charset="0"/>
+              </a:defRPr>
+            </a:lvl6pPr>
+            <a:lvl7pPr marL="2971800" indent="-228600" eaLnBrk="0" fontAlgn="base" hangingPunct="0">
+              <a:spcBef>
+                <a:spcPct val="20000"/>
+              </a:spcBef>
+              <a:spcAft>
+                <a:spcPct val="0"/>
+              </a:spcAft>
+              <a:buChar char="»"/>
+              <a:defRPr sz="2000">
+                <a:solidFill>
+                  <a:schemeClr val="tx1"/>
+                </a:solidFill>
+                <a:latin typeface="Times New Roman" panose="02020603050405020304" pitchFamily="18" charset="0"/>
+              </a:defRPr>
+            </a:lvl7pPr>
+            <a:lvl8pPr marL="3429000" indent="-228600" eaLnBrk="0" fontAlgn="base" hangingPunct="0">
+              <a:spcBef>
+                <a:spcPct val="20000"/>
+              </a:spcBef>
+              <a:spcAft>
+                <a:spcPct val="0"/>
+              </a:spcAft>
+              <a:buChar char="»"/>
+              <a:defRPr sz="2000">
+                <a:solidFill>
+                  <a:schemeClr val="tx1"/>
+                </a:solidFill>
+                <a:latin typeface="Times New Roman" panose="02020603050405020304" pitchFamily="18" charset="0"/>
+              </a:defRPr>
+            </a:lvl8pPr>
+            <a:lvl9pPr marL="3886200" indent="-228600" eaLnBrk="0" fontAlgn="base" hangingPunct="0">
+              <a:spcBef>
+                <a:spcPct val="20000"/>
+              </a:spcBef>
+              <a:spcAft>
+                <a:spcPct val="0"/>
+              </a:spcAft>
+              <a:buChar char="»"/>
+              <a:defRPr sz="2000">
+                <a:solidFill>
+                  <a:schemeClr val="tx1"/>
+                </a:solidFill>
+                <a:latin typeface="Times New Roman" panose="02020603050405020304" pitchFamily="18" charset="0"/>
+              </a:defRPr>
+            </a:lvl9pPr>
+          </a:lstStyle>
+          <a:p>
+            <a:pPr>
+              <a:spcBef>
+                <a:spcPct val="50000"/>
+              </a:spcBef>
+              <a:buFontTx/>
+              <a:buNone/>
+            </a:pPr>
+            <a:endParaRPr lang="en-US" altLang="en-US" sz="1600"/>
+          </a:p>
+        </p:txBody>
+      </p:sp>
+      <p:sp>
+        <p:nvSpPr>
+          <p:cNvPr id="13" name="Line 15"/>
+          <p:cNvSpPr>
+            <a:spLocks noChangeShapeType="1"/>
+          </p:cNvSpPr>
+          <p:nvPr/>
+        </p:nvSpPr>
+        <p:spPr bwMode="auto">
+          <a:xfrm flipV="1">
+            <a:off x="3536349" y="2112744"/>
+            <a:ext cx="0" cy="292100"/>
+          </a:xfrm>
+          <a:prstGeom prst="line">
+            <a:avLst/>
+          </a:prstGeom>
+          <a:noFill/>
+          <a:ln w="9525">
+            <a:solidFill>
+              <a:schemeClr val="tx1"/>
+            </a:solidFill>
+            <a:round/>
+            <a:headEnd/>
+            <a:tailEnd/>
+          </a:ln>
+          <a:extLst>
+            <a:ext uri="{909E8E84-426E-40DD-AFC4-6F175D3DCCD1}">
+              <a14:hiddenFill xmlns:a14="http://schemas.microsoft.com/office/drawing/2010/main">
+                <a:noFill/>
+              </a14:hiddenFill>
+            </a:ext>
+          </a:extLst>
+        </p:spPr>
+        <p:txBody>
+          <a:bodyPr wrap="none" anchor="ctr"/>
+          <a:lstStyle/>
+          <a:p>
+            <a:endParaRPr lang="en-US"/>
+          </a:p>
+        </p:txBody>
+      </p:sp>
+      <p:sp>
+        <p:nvSpPr>
+          <p:cNvPr id="14" name="Line 16"/>
+          <p:cNvSpPr>
+            <a:spLocks noChangeShapeType="1"/>
+          </p:cNvSpPr>
+          <p:nvPr/>
+        </p:nvSpPr>
+        <p:spPr bwMode="auto">
+          <a:xfrm>
+            <a:off x="4877786" y="2569944"/>
+            <a:ext cx="2590800" cy="0"/>
+          </a:xfrm>
+          <a:prstGeom prst="line">
+            <a:avLst/>
+          </a:prstGeom>
+          <a:noFill/>
+          <a:ln w="9525">
+            <a:solidFill>
+              <a:schemeClr val="tx1"/>
+            </a:solidFill>
+            <a:round/>
+            <a:headEnd/>
+            <a:tailEnd/>
+          </a:ln>
+          <a:extLst>
+            <a:ext uri="{909E8E84-426E-40DD-AFC4-6F175D3DCCD1}">
+              <a14:hiddenFill xmlns:a14="http://schemas.microsoft.com/office/drawing/2010/main">
+                <a:noFill/>
+              </a14:hiddenFill>
+            </a:ext>
+          </a:extLst>
+        </p:spPr>
+        <p:txBody>
+          <a:bodyPr wrap="none" anchor="ctr"/>
+          <a:lstStyle/>
+          <a:p>
+            <a:endParaRPr lang="en-US"/>
+          </a:p>
+        </p:txBody>
+      </p:sp>
+      <p:sp>
+        <p:nvSpPr>
+          <p:cNvPr id="15" name="Oval 17"/>
+          <p:cNvSpPr>
+            <a:spLocks noChangeArrowheads="1"/>
+          </p:cNvSpPr>
+          <p:nvPr/>
+        </p:nvSpPr>
+        <p:spPr bwMode="auto">
+          <a:xfrm>
+            <a:off x="2220311" y="3155731"/>
+            <a:ext cx="2362200" cy="609600"/>
+          </a:xfrm>
+          <a:prstGeom prst="ellipse">
+            <a:avLst/>
+          </a:prstGeom>
+          <a:noFill/>
+          <a:ln w="9525">
+            <a:solidFill>
+              <a:schemeClr val="tx1"/>
+            </a:solidFill>
+            <a:round/>
+            <a:headEnd/>
+            <a:tailEnd/>
+          </a:ln>
+          <a:extLst>
+            <a:ext uri="{909E8E84-426E-40DD-AFC4-6F175D3DCCD1}">
+              <a14:hiddenFill xmlns:a14="http://schemas.microsoft.com/office/drawing/2010/main">
+                <a:solidFill>
+                  <a:srgbClr val="FFFFFF"/>
+                </a:solidFill>
+              </a14:hiddenFill>
+            </a:ext>
+          </a:extLst>
+        </p:spPr>
+        <p:txBody>
+          <a:bodyPr wrap="none" anchor="ctr"/>
+          <a:lstStyle>
+            <a:lvl1pPr>
+              <a:spcBef>
+                <a:spcPct val="20000"/>
+              </a:spcBef>
+              <a:buChar char="•"/>
+              <a:defRPr sz="2800">
+                <a:solidFill>
+                  <a:schemeClr val="tx1"/>
+                </a:solidFill>
+                <a:latin typeface="Times New Roman" panose="02020603050405020304" pitchFamily="18" charset="0"/>
+              </a:defRPr>
+            </a:lvl1pPr>
+            <a:lvl2pPr marL="742950" indent="-285750">
+              <a:spcBef>
+                <a:spcPct val="20000"/>
+              </a:spcBef>
+              <a:buChar char="–"/>
+              <a:defRPr sz="2200">
+                <a:solidFill>
+                  <a:schemeClr val="tx1"/>
+                </a:solidFill>
+                <a:latin typeface="Times New Roman" panose="02020603050405020304" pitchFamily="18" charset="0"/>
+              </a:defRPr>
+            </a:lvl2pPr>
+            <a:lvl3pPr marL="1143000" indent="-228600">
+              <a:spcBef>
+                <a:spcPct val="20000"/>
+              </a:spcBef>
+              <a:buChar char="•"/>
+              <a:defRPr sz="2000">
+                <a:solidFill>
+                  <a:schemeClr val="tx1"/>
+                </a:solidFill>
+                <a:latin typeface="Times New Roman" panose="02020603050405020304" pitchFamily="18" charset="0"/>
+              </a:defRPr>
+            </a:lvl3pPr>
+            <a:lvl4pPr marL="1600200" indent="-228600">
+              <a:spcBef>
+                <a:spcPct val="20000"/>
+              </a:spcBef>
+              <a:buChar char="–"/>
+              <a:defRPr sz="2000">
+                <a:solidFill>
+                  <a:schemeClr val="tx1"/>
+                </a:solidFill>
+                <a:latin typeface="Times New Roman" panose="02020603050405020304" pitchFamily="18" charset="0"/>
+              </a:defRPr>
+            </a:lvl4pPr>
+            <a:lvl5pPr marL="2057400" indent="-228600">
+              <a:spcBef>
+                <a:spcPct val="20000"/>
+              </a:spcBef>
+              <a:buChar char="»"/>
+              <a:defRPr sz="2000">
+                <a:solidFill>
+                  <a:schemeClr val="tx1"/>
+                </a:solidFill>
+                <a:latin typeface="Times New Roman" panose="02020603050405020304" pitchFamily="18" charset="0"/>
+              </a:defRPr>
+            </a:lvl5pPr>
+            <a:lvl6pPr marL="2514600" indent="-228600" eaLnBrk="0" fontAlgn="base" hangingPunct="0">
+              <a:spcBef>
+                <a:spcPct val="20000"/>
+              </a:spcBef>
+              <a:spcAft>
+                <a:spcPct val="0"/>
+              </a:spcAft>
+              <a:buChar char="»"/>
+              <a:defRPr sz="2000">
+                <a:solidFill>
+                  <a:schemeClr val="tx1"/>
+                </a:solidFill>
+                <a:latin typeface="Times New Roman" panose="02020603050405020304" pitchFamily="18" charset="0"/>
+              </a:defRPr>
+            </a:lvl6pPr>
+            <a:lvl7pPr marL="2971800" indent="-228600" eaLnBrk="0" fontAlgn="base" hangingPunct="0">
+              <a:spcBef>
+                <a:spcPct val="20000"/>
+              </a:spcBef>
+              <a:spcAft>
+                <a:spcPct val="0"/>
+              </a:spcAft>
+              <a:buChar char="»"/>
+              <a:defRPr sz="2000">
+                <a:solidFill>
+                  <a:schemeClr val="tx1"/>
+                </a:solidFill>
+                <a:latin typeface="Times New Roman" panose="02020603050405020304" pitchFamily="18" charset="0"/>
+              </a:defRPr>
+            </a:lvl7pPr>
+            <a:lvl8pPr marL="3429000" indent="-228600" eaLnBrk="0" fontAlgn="base" hangingPunct="0">
+              <a:spcBef>
+                <a:spcPct val="20000"/>
+              </a:spcBef>
+              <a:spcAft>
+                <a:spcPct val="0"/>
+              </a:spcAft>
+              <a:buChar char="»"/>
+              <a:defRPr sz="2000">
+                <a:solidFill>
+                  <a:schemeClr val="tx1"/>
+                </a:solidFill>
+                <a:latin typeface="Times New Roman" panose="02020603050405020304" pitchFamily="18" charset="0"/>
+              </a:defRPr>
+            </a:lvl8pPr>
+            <a:lvl9pPr marL="3886200" indent="-228600" eaLnBrk="0" fontAlgn="base" hangingPunct="0">
+              <a:spcBef>
+                <a:spcPct val="20000"/>
+              </a:spcBef>
+              <a:spcAft>
+                <a:spcPct val="0"/>
+              </a:spcAft>
+              <a:buChar char="»"/>
+              <a:defRPr sz="2000">
+                <a:solidFill>
+                  <a:schemeClr val="tx1"/>
+                </a:solidFill>
+                <a:latin typeface="Times New Roman" panose="02020603050405020304" pitchFamily="18" charset="0"/>
+              </a:defRPr>
+            </a:lvl9pPr>
+          </a:lstStyle>
+          <a:p>
+            <a:pPr>
+              <a:spcBef>
+                <a:spcPct val="50000"/>
+              </a:spcBef>
+              <a:buFontTx/>
+              <a:buNone/>
+            </a:pPr>
+            <a:endParaRPr lang="en-US" altLang="en-US" sz="1600"/>
+          </a:p>
+        </p:txBody>
+      </p:sp>
+      <p:sp>
+        <p:nvSpPr>
+          <p:cNvPr id="16" name="Oval 18"/>
+          <p:cNvSpPr>
+            <a:spLocks noChangeArrowheads="1"/>
+          </p:cNvSpPr>
+          <p:nvPr/>
+        </p:nvSpPr>
+        <p:spPr bwMode="auto">
+          <a:xfrm>
+            <a:off x="1991711" y="4146331"/>
+            <a:ext cx="3048000" cy="914400"/>
+          </a:xfrm>
+          <a:prstGeom prst="ellipse">
+            <a:avLst/>
+          </a:prstGeom>
+          <a:noFill/>
+          <a:ln w="9525">
+            <a:solidFill>
+              <a:schemeClr val="tx1"/>
+            </a:solidFill>
+            <a:round/>
+            <a:headEnd/>
+            <a:tailEnd/>
+          </a:ln>
+          <a:extLst>
+            <a:ext uri="{909E8E84-426E-40DD-AFC4-6F175D3DCCD1}">
+              <a14:hiddenFill xmlns:a14="http://schemas.microsoft.com/office/drawing/2010/main">
+                <a:solidFill>
+                  <a:srgbClr val="FFFFFF"/>
+                </a:solidFill>
+              </a14:hiddenFill>
+            </a:ext>
+          </a:extLst>
+        </p:spPr>
+        <p:txBody>
+          <a:bodyPr wrap="none" anchor="ctr"/>
+          <a:lstStyle>
+            <a:lvl1pPr>
+              <a:spcBef>
+                <a:spcPct val="20000"/>
+              </a:spcBef>
+              <a:buChar char="•"/>
+              <a:defRPr sz="2800">
+                <a:solidFill>
+                  <a:schemeClr val="tx1"/>
+                </a:solidFill>
+                <a:latin typeface="Times New Roman" panose="02020603050405020304" pitchFamily="18" charset="0"/>
+              </a:defRPr>
+            </a:lvl1pPr>
+            <a:lvl2pPr marL="742950" indent="-285750">
+              <a:spcBef>
+                <a:spcPct val="20000"/>
+              </a:spcBef>
+              <a:buChar char="–"/>
+              <a:defRPr sz="2200">
+                <a:solidFill>
+                  <a:schemeClr val="tx1"/>
+                </a:solidFill>
+                <a:latin typeface="Times New Roman" panose="02020603050405020304" pitchFamily="18" charset="0"/>
+              </a:defRPr>
+            </a:lvl2pPr>
+            <a:lvl3pPr marL="1143000" indent="-228600">
+              <a:spcBef>
+                <a:spcPct val="20000"/>
+              </a:spcBef>
+              <a:buChar char="•"/>
+              <a:defRPr sz="2000">
+                <a:solidFill>
+                  <a:schemeClr val="tx1"/>
+                </a:solidFill>
+                <a:latin typeface="Times New Roman" panose="02020603050405020304" pitchFamily="18" charset="0"/>
+              </a:defRPr>
+            </a:lvl3pPr>
+            <a:lvl4pPr marL="1600200" indent="-228600">
+              <a:spcBef>
+                <a:spcPct val="20000"/>
+              </a:spcBef>
+              <a:buChar char="–"/>
+              <a:defRPr sz="2000">
+                <a:solidFill>
+                  <a:schemeClr val="tx1"/>
+                </a:solidFill>
+                <a:latin typeface="Times New Roman" panose="02020603050405020304" pitchFamily="18" charset="0"/>
+              </a:defRPr>
+            </a:lvl4pPr>
+            <a:lvl5pPr marL="2057400" indent="-228600">
+              <a:spcBef>
+                <a:spcPct val="20000"/>
+              </a:spcBef>
+              <a:buChar char="»"/>
+              <a:defRPr sz="2000">
+                <a:solidFill>
+                  <a:schemeClr val="tx1"/>
+                </a:solidFill>
+                <a:latin typeface="Times New Roman" panose="02020603050405020304" pitchFamily="18" charset="0"/>
+              </a:defRPr>
+            </a:lvl5pPr>
+            <a:lvl6pPr marL="2514600" indent="-228600" eaLnBrk="0" fontAlgn="base" hangingPunct="0">
+              <a:spcBef>
+                <a:spcPct val="20000"/>
+              </a:spcBef>
+              <a:spcAft>
+                <a:spcPct val="0"/>
+              </a:spcAft>
+              <a:buChar char="»"/>
+              <a:defRPr sz="2000">
+                <a:solidFill>
+                  <a:schemeClr val="tx1"/>
+                </a:solidFill>
+                <a:latin typeface="Times New Roman" panose="02020603050405020304" pitchFamily="18" charset="0"/>
+              </a:defRPr>
+            </a:lvl6pPr>
+            <a:lvl7pPr marL="2971800" indent="-228600" eaLnBrk="0" fontAlgn="base" hangingPunct="0">
+              <a:spcBef>
+                <a:spcPct val="20000"/>
+              </a:spcBef>
+              <a:spcAft>
+                <a:spcPct val="0"/>
+              </a:spcAft>
+              <a:buChar char="»"/>
+              <a:defRPr sz="2000">
+                <a:solidFill>
+                  <a:schemeClr val="tx1"/>
+                </a:solidFill>
+                <a:latin typeface="Times New Roman" panose="02020603050405020304" pitchFamily="18" charset="0"/>
+              </a:defRPr>
+            </a:lvl7pPr>
+            <a:lvl8pPr marL="3429000" indent="-228600" eaLnBrk="0" fontAlgn="base" hangingPunct="0">
+              <a:spcBef>
+                <a:spcPct val="20000"/>
+              </a:spcBef>
+              <a:spcAft>
+                <a:spcPct val="0"/>
+              </a:spcAft>
+              <a:buChar char="»"/>
+              <a:defRPr sz="2000">
+                <a:solidFill>
+                  <a:schemeClr val="tx1"/>
+                </a:solidFill>
+                <a:latin typeface="Times New Roman" panose="02020603050405020304" pitchFamily="18" charset="0"/>
+              </a:defRPr>
+            </a:lvl8pPr>
+            <a:lvl9pPr marL="3886200" indent="-228600" eaLnBrk="0" fontAlgn="base" hangingPunct="0">
+              <a:spcBef>
+                <a:spcPct val="20000"/>
+              </a:spcBef>
+              <a:spcAft>
+                <a:spcPct val="0"/>
+              </a:spcAft>
+              <a:buChar char="»"/>
+              <a:defRPr sz="2000">
+                <a:solidFill>
+                  <a:schemeClr val="tx1"/>
+                </a:solidFill>
+                <a:latin typeface="Times New Roman" panose="02020603050405020304" pitchFamily="18" charset="0"/>
+              </a:defRPr>
+            </a:lvl9pPr>
+          </a:lstStyle>
+          <a:p>
+            <a:pPr>
+              <a:spcBef>
+                <a:spcPct val="50000"/>
+              </a:spcBef>
+              <a:buFontTx/>
+              <a:buNone/>
+            </a:pPr>
+            <a:endParaRPr lang="en-US" altLang="en-US" sz="1600"/>
+          </a:p>
+        </p:txBody>
+      </p:sp>
+      <p:sp>
+        <p:nvSpPr>
+          <p:cNvPr id="17" name="Oval 19"/>
+          <p:cNvSpPr>
+            <a:spLocks noChangeArrowheads="1"/>
+          </p:cNvSpPr>
+          <p:nvPr/>
+        </p:nvSpPr>
+        <p:spPr bwMode="auto">
+          <a:xfrm>
+            <a:off x="2220311" y="5365531"/>
+            <a:ext cx="2362200" cy="533400"/>
+          </a:xfrm>
+          <a:prstGeom prst="ellipse">
+            <a:avLst/>
+          </a:prstGeom>
+          <a:noFill/>
+          <a:ln w="9525">
+            <a:solidFill>
+              <a:schemeClr val="tx1"/>
+            </a:solidFill>
+            <a:round/>
+            <a:headEnd/>
+            <a:tailEnd/>
+          </a:ln>
+          <a:extLst>
+            <a:ext uri="{909E8E84-426E-40DD-AFC4-6F175D3DCCD1}">
+              <a14:hiddenFill xmlns:a14="http://schemas.microsoft.com/office/drawing/2010/main">
+                <a:solidFill>
+                  <a:srgbClr val="FFFFFF"/>
+                </a:solidFill>
+              </a14:hiddenFill>
+            </a:ext>
+          </a:extLst>
+        </p:spPr>
+        <p:txBody>
+          <a:bodyPr wrap="none" anchor="ctr"/>
+          <a:lstStyle>
+            <a:lvl1pPr>
+              <a:spcBef>
+                <a:spcPct val="20000"/>
+              </a:spcBef>
+              <a:buChar char="•"/>
+              <a:defRPr sz="2800">
+                <a:solidFill>
+                  <a:schemeClr val="tx1"/>
+                </a:solidFill>
+                <a:latin typeface="Times New Roman" panose="02020603050405020304" pitchFamily="18" charset="0"/>
+              </a:defRPr>
+            </a:lvl1pPr>
+            <a:lvl2pPr marL="742950" indent="-285750">
+              <a:spcBef>
+                <a:spcPct val="20000"/>
+              </a:spcBef>
+              <a:buChar char="–"/>
+              <a:defRPr sz="2200">
+                <a:solidFill>
+                  <a:schemeClr val="tx1"/>
+                </a:solidFill>
+                <a:latin typeface="Times New Roman" panose="02020603050405020304" pitchFamily="18" charset="0"/>
+              </a:defRPr>
+            </a:lvl2pPr>
+            <a:lvl3pPr marL="1143000" indent="-228600">
+              <a:spcBef>
+                <a:spcPct val="20000"/>
+              </a:spcBef>
+              <a:buChar char="•"/>
+              <a:defRPr sz="2000">
+                <a:solidFill>
+                  <a:schemeClr val="tx1"/>
+                </a:solidFill>
+                <a:latin typeface="Times New Roman" panose="02020603050405020304" pitchFamily="18" charset="0"/>
+              </a:defRPr>
+            </a:lvl3pPr>
+            <a:lvl4pPr marL="1600200" indent="-228600">
+              <a:spcBef>
+                <a:spcPct val="20000"/>
+              </a:spcBef>
+              <a:buChar char="–"/>
+              <a:defRPr sz="2000">
+                <a:solidFill>
+                  <a:schemeClr val="tx1"/>
+                </a:solidFill>
+                <a:latin typeface="Times New Roman" panose="02020603050405020304" pitchFamily="18" charset="0"/>
+              </a:defRPr>
+            </a:lvl4pPr>
+            <a:lvl5pPr marL="2057400" indent="-228600">
+              <a:spcBef>
+                <a:spcPct val="20000"/>
+              </a:spcBef>
+              <a:buChar char="»"/>
+              <a:defRPr sz="2000">
+                <a:solidFill>
+                  <a:schemeClr val="tx1"/>
+                </a:solidFill>
+                <a:latin typeface="Times New Roman" panose="02020603050405020304" pitchFamily="18" charset="0"/>
+              </a:defRPr>
+            </a:lvl5pPr>
+            <a:lvl6pPr marL="2514600" indent="-228600" eaLnBrk="0" fontAlgn="base" hangingPunct="0">
+              <a:spcBef>
+                <a:spcPct val="20000"/>
+              </a:spcBef>
+              <a:spcAft>
+                <a:spcPct val="0"/>
+              </a:spcAft>
+              <a:buChar char="»"/>
+              <a:defRPr sz="2000">
+                <a:solidFill>
+                  <a:schemeClr val="tx1"/>
+                </a:solidFill>
+                <a:latin typeface="Times New Roman" panose="02020603050405020304" pitchFamily="18" charset="0"/>
+              </a:defRPr>
+            </a:lvl6pPr>
+            <a:lvl7pPr marL="2971800" indent="-228600" eaLnBrk="0" fontAlgn="base" hangingPunct="0">
+              <a:spcBef>
+                <a:spcPct val="20000"/>
+              </a:spcBef>
+              <a:spcAft>
+                <a:spcPct val="0"/>
+              </a:spcAft>
+              <a:buChar char="»"/>
+              <a:defRPr sz="2000">
+                <a:solidFill>
+                  <a:schemeClr val="tx1"/>
+                </a:solidFill>
+                <a:latin typeface="Times New Roman" panose="02020603050405020304" pitchFamily="18" charset="0"/>
+              </a:defRPr>
+            </a:lvl7pPr>
+            <a:lvl8pPr marL="3429000" indent="-228600" eaLnBrk="0" fontAlgn="base" hangingPunct="0">
+              <a:spcBef>
+                <a:spcPct val="20000"/>
+              </a:spcBef>
+              <a:spcAft>
+                <a:spcPct val="0"/>
+              </a:spcAft>
+              <a:buChar char="»"/>
+              <a:defRPr sz="2000">
+                <a:solidFill>
+                  <a:schemeClr val="tx1"/>
+                </a:solidFill>
+                <a:latin typeface="Times New Roman" panose="02020603050405020304" pitchFamily="18" charset="0"/>
+              </a:defRPr>
+            </a:lvl8pPr>
+            <a:lvl9pPr marL="3886200" indent="-228600" eaLnBrk="0" fontAlgn="base" hangingPunct="0">
+              <a:spcBef>
+                <a:spcPct val="20000"/>
+              </a:spcBef>
+              <a:spcAft>
+                <a:spcPct val="0"/>
+              </a:spcAft>
+              <a:buChar char="»"/>
+              <a:defRPr sz="2000">
+                <a:solidFill>
+                  <a:schemeClr val="tx1"/>
+                </a:solidFill>
+                <a:latin typeface="Times New Roman" panose="02020603050405020304" pitchFamily="18" charset="0"/>
+              </a:defRPr>
+            </a:lvl9pPr>
+          </a:lstStyle>
+          <a:p>
+            <a:pPr>
+              <a:spcBef>
+                <a:spcPct val="50000"/>
+              </a:spcBef>
+              <a:buFontTx/>
+              <a:buNone/>
+            </a:pPr>
+            <a:endParaRPr lang="en-US" altLang="en-US" sz="1600"/>
+          </a:p>
+        </p:txBody>
+      </p:sp>
+      <p:sp>
+        <p:nvSpPr>
+          <p:cNvPr id="18" name="Text Box 4"/>
+          <p:cNvSpPr txBox="1">
+            <a:spLocks noChangeArrowheads="1"/>
+          </p:cNvSpPr>
+          <p:nvPr/>
+        </p:nvSpPr>
+        <p:spPr bwMode="auto">
+          <a:xfrm>
+            <a:off x="6639911" y="3993931"/>
+            <a:ext cx="3194050" cy="822325"/>
+          </a:xfrm>
+          <a:prstGeom prst="rect">
+            <a:avLst/>
+          </a:prstGeom>
+          <a:noFill/>
+          <a:ln>
+            <a:noFill/>
+          </a:ln>
+          <a:extLst>
+            <a:ext uri="{909E8E84-426E-40DD-AFC4-6F175D3DCCD1}">
+              <a14:hiddenFill xmlns:a14="http://schemas.microsoft.com/office/drawing/2010/main">
+                <a:solidFill>
+                  <a:srgbClr val="FFFFFF"/>
+                </a:solidFill>
+              </a14:hiddenFill>
+            </a:ext>
+            <a:ext uri="{91240B29-F687-4F45-9708-019B960494DF}">
+              <a14:hiddenLine xmlns:a14="http://schemas.microsoft.com/office/drawing/2010/main" w="9525">
+                <a:solidFill>
+                  <a:srgbClr val="000000"/>
+                </a:solidFill>
+                <a:miter lim="800000"/>
+                <a:headEnd/>
+                <a:tailEnd/>
+              </a14:hiddenLine>
+            </a:ext>
+          </a:extLst>
+        </p:spPr>
+        <p:txBody>
+          <a:bodyPr>
+            <a:spAutoFit/>
+          </a:bodyPr>
+          <a:lstStyle>
+            <a:lvl1pPr>
+              <a:spcBef>
+                <a:spcPct val="20000"/>
+              </a:spcBef>
+              <a:buChar char="•"/>
+              <a:defRPr sz="2800">
+                <a:solidFill>
+                  <a:schemeClr val="tx1"/>
+                </a:solidFill>
+                <a:latin typeface="Times New Roman" panose="02020603050405020304" pitchFamily="18" charset="0"/>
+              </a:defRPr>
+            </a:lvl1pPr>
+            <a:lvl2pPr marL="742950" indent="-285750">
+              <a:spcBef>
+                <a:spcPct val="20000"/>
+              </a:spcBef>
+              <a:buChar char="–"/>
+              <a:defRPr sz="2200">
+                <a:solidFill>
+                  <a:schemeClr val="tx1"/>
+                </a:solidFill>
+                <a:latin typeface="Times New Roman" panose="02020603050405020304" pitchFamily="18" charset="0"/>
+              </a:defRPr>
+            </a:lvl2pPr>
+            <a:lvl3pPr marL="1143000" indent="-228600">
+              <a:spcBef>
+                <a:spcPct val="20000"/>
+              </a:spcBef>
+              <a:buChar char="•"/>
+              <a:defRPr sz="2000">
+                <a:solidFill>
+                  <a:schemeClr val="tx1"/>
+                </a:solidFill>
+                <a:latin typeface="Times New Roman" panose="02020603050405020304" pitchFamily="18" charset="0"/>
+              </a:defRPr>
+            </a:lvl3pPr>
+            <a:lvl4pPr marL="1600200" indent="-228600">
+              <a:spcBef>
+                <a:spcPct val="20000"/>
+              </a:spcBef>
+              <a:buChar char="–"/>
+              <a:defRPr sz="2000">
+                <a:solidFill>
+                  <a:schemeClr val="tx1"/>
+                </a:solidFill>
+                <a:latin typeface="Times New Roman" panose="02020603050405020304" pitchFamily="18" charset="0"/>
+              </a:defRPr>
+            </a:lvl4pPr>
+            <a:lvl5pPr marL="2057400" indent="-228600">
+              <a:spcBef>
+                <a:spcPct val="20000"/>
+              </a:spcBef>
+              <a:buChar char="»"/>
+              <a:defRPr sz="2000">
+                <a:solidFill>
+                  <a:schemeClr val="tx1"/>
+                </a:solidFill>
+                <a:latin typeface="Times New Roman" panose="02020603050405020304" pitchFamily="18" charset="0"/>
+              </a:defRPr>
+            </a:lvl5pPr>
+            <a:lvl6pPr marL="2514600" indent="-228600" eaLnBrk="0" fontAlgn="base" hangingPunct="0">
+              <a:spcBef>
+                <a:spcPct val="20000"/>
+              </a:spcBef>
+              <a:spcAft>
+                <a:spcPct val="0"/>
+              </a:spcAft>
+              <a:buChar char="»"/>
+              <a:defRPr sz="2000">
+                <a:solidFill>
+                  <a:schemeClr val="tx1"/>
+                </a:solidFill>
+                <a:latin typeface="Times New Roman" panose="02020603050405020304" pitchFamily="18" charset="0"/>
+              </a:defRPr>
+            </a:lvl6pPr>
+            <a:lvl7pPr marL="2971800" indent="-228600" eaLnBrk="0" fontAlgn="base" hangingPunct="0">
+              <a:spcBef>
+                <a:spcPct val="20000"/>
+              </a:spcBef>
+              <a:spcAft>
+                <a:spcPct val="0"/>
+              </a:spcAft>
+              <a:buChar char="»"/>
+              <a:defRPr sz="2000">
+                <a:solidFill>
+                  <a:schemeClr val="tx1"/>
+                </a:solidFill>
+                <a:latin typeface="Times New Roman" panose="02020603050405020304" pitchFamily="18" charset="0"/>
+              </a:defRPr>
+            </a:lvl7pPr>
+            <a:lvl8pPr marL="3429000" indent="-228600" eaLnBrk="0" fontAlgn="base" hangingPunct="0">
+              <a:spcBef>
+                <a:spcPct val="20000"/>
+              </a:spcBef>
+              <a:spcAft>
+                <a:spcPct val="0"/>
+              </a:spcAft>
+              <a:buChar char="»"/>
+              <a:defRPr sz="2000">
+                <a:solidFill>
+                  <a:schemeClr val="tx1"/>
+                </a:solidFill>
+                <a:latin typeface="Times New Roman" panose="02020603050405020304" pitchFamily="18" charset="0"/>
+              </a:defRPr>
+            </a:lvl8pPr>
+            <a:lvl9pPr marL="3886200" indent="-228600" eaLnBrk="0" fontAlgn="base" hangingPunct="0">
+              <a:spcBef>
+                <a:spcPct val="20000"/>
+              </a:spcBef>
+              <a:spcAft>
+                <a:spcPct val="0"/>
+              </a:spcAft>
+              <a:buChar char="»"/>
+              <a:defRPr sz="2000">
+                <a:solidFill>
+                  <a:schemeClr val="tx1"/>
+                </a:solidFill>
+                <a:latin typeface="Times New Roman" panose="02020603050405020304" pitchFamily="18" charset="0"/>
+              </a:defRPr>
+            </a:lvl9pPr>
+          </a:lstStyle>
+          <a:p>
+            <a:pPr>
+              <a:spcBef>
+                <a:spcPct val="50000"/>
+              </a:spcBef>
+              <a:buFontTx/>
+              <a:buNone/>
+            </a:pPr>
+            <a:r>
+              <a:rPr lang="en-US" altLang="en-US" sz="1600"/>
+              <a:t>doGet(HttpServletRequest,</a:t>
+            </a:r>
+          </a:p>
+          <a:p>
+            <a:pPr>
+              <a:spcBef>
+                <a:spcPct val="50000"/>
+              </a:spcBef>
+              <a:buFontTx/>
+              <a:buNone/>
+            </a:pPr>
+            <a:r>
+              <a:rPr lang="en-US" altLang="en-US" sz="1600"/>
+              <a:t>	HttpServletResponse);</a:t>
+            </a:r>
+          </a:p>
+        </p:txBody>
+      </p:sp>
+      <p:sp>
+        <p:nvSpPr>
+          <p:cNvPr id="19" name="Text Box 5"/>
+          <p:cNvSpPr txBox="1">
+            <a:spLocks noChangeArrowheads="1"/>
+          </p:cNvSpPr>
+          <p:nvPr/>
+        </p:nvSpPr>
+        <p:spPr bwMode="auto">
+          <a:xfrm>
+            <a:off x="6639911" y="4755931"/>
+            <a:ext cx="3003550" cy="1187450"/>
+          </a:xfrm>
+          <a:prstGeom prst="rect">
+            <a:avLst/>
+          </a:prstGeom>
+          <a:noFill/>
+          <a:ln>
+            <a:noFill/>
+          </a:ln>
+          <a:extLst>
+            <a:ext uri="{909E8E84-426E-40DD-AFC4-6F175D3DCCD1}">
+              <a14:hiddenFill xmlns:a14="http://schemas.microsoft.com/office/drawing/2010/main">
+                <a:solidFill>
+                  <a:srgbClr val="FFFFFF"/>
+                </a:solidFill>
+              </a14:hiddenFill>
+            </a:ext>
+            <a:ext uri="{91240B29-F687-4F45-9708-019B960494DF}">
+              <a14:hiddenLine xmlns:a14="http://schemas.microsoft.com/office/drawing/2010/main" w="9525">
+                <a:solidFill>
+                  <a:srgbClr val="000000"/>
+                </a:solidFill>
+                <a:miter lim="800000"/>
+                <a:headEnd/>
+                <a:tailEnd/>
+              </a14:hiddenLine>
+            </a:ext>
+          </a:extLst>
+        </p:spPr>
+        <p:txBody>
+          <a:bodyPr wrap="none">
+            <a:spAutoFit/>
+          </a:bodyPr>
+          <a:lstStyle>
+            <a:lvl1pPr>
+              <a:spcBef>
+                <a:spcPct val="20000"/>
+              </a:spcBef>
+              <a:buChar char="•"/>
+              <a:defRPr sz="2800">
+                <a:solidFill>
+                  <a:schemeClr val="tx1"/>
+                </a:solidFill>
+                <a:latin typeface="Times New Roman" panose="02020603050405020304" pitchFamily="18" charset="0"/>
+              </a:defRPr>
+            </a:lvl1pPr>
+            <a:lvl2pPr marL="742950" indent="-285750">
+              <a:spcBef>
+                <a:spcPct val="20000"/>
+              </a:spcBef>
+              <a:buChar char="–"/>
+              <a:defRPr sz="2200">
+                <a:solidFill>
+                  <a:schemeClr val="tx1"/>
+                </a:solidFill>
+                <a:latin typeface="Times New Roman" panose="02020603050405020304" pitchFamily="18" charset="0"/>
+              </a:defRPr>
+            </a:lvl2pPr>
+            <a:lvl3pPr marL="1143000" indent="-228600">
+              <a:spcBef>
+                <a:spcPct val="20000"/>
+              </a:spcBef>
+              <a:buChar char="•"/>
+              <a:defRPr sz="2000">
+                <a:solidFill>
+                  <a:schemeClr val="tx1"/>
+                </a:solidFill>
+                <a:latin typeface="Times New Roman" panose="02020603050405020304" pitchFamily="18" charset="0"/>
+              </a:defRPr>
+            </a:lvl3pPr>
+            <a:lvl4pPr marL="1600200" indent="-228600">
+              <a:spcBef>
+                <a:spcPct val="20000"/>
+              </a:spcBef>
+              <a:buChar char="–"/>
+              <a:defRPr sz="2000">
+                <a:solidFill>
+                  <a:schemeClr val="tx1"/>
+                </a:solidFill>
+                <a:latin typeface="Times New Roman" panose="02020603050405020304" pitchFamily="18" charset="0"/>
+              </a:defRPr>
+            </a:lvl4pPr>
+            <a:lvl5pPr marL="2057400" indent="-228600">
+              <a:spcBef>
+                <a:spcPct val="20000"/>
+              </a:spcBef>
+              <a:buChar char="»"/>
+              <a:defRPr sz="2000">
+                <a:solidFill>
+                  <a:schemeClr val="tx1"/>
+                </a:solidFill>
+                <a:latin typeface="Times New Roman" panose="02020603050405020304" pitchFamily="18" charset="0"/>
+              </a:defRPr>
+            </a:lvl5pPr>
+            <a:lvl6pPr marL="2514600" indent="-228600" eaLnBrk="0" fontAlgn="base" hangingPunct="0">
+              <a:spcBef>
+                <a:spcPct val="20000"/>
+              </a:spcBef>
+              <a:spcAft>
+                <a:spcPct val="0"/>
+              </a:spcAft>
+              <a:buChar char="»"/>
+              <a:defRPr sz="2000">
+                <a:solidFill>
+                  <a:schemeClr val="tx1"/>
+                </a:solidFill>
+                <a:latin typeface="Times New Roman" panose="02020603050405020304" pitchFamily="18" charset="0"/>
+              </a:defRPr>
+            </a:lvl6pPr>
+            <a:lvl7pPr marL="2971800" indent="-228600" eaLnBrk="0" fontAlgn="base" hangingPunct="0">
+              <a:spcBef>
+                <a:spcPct val="20000"/>
+              </a:spcBef>
+              <a:spcAft>
+                <a:spcPct val="0"/>
+              </a:spcAft>
+              <a:buChar char="»"/>
+              <a:defRPr sz="2000">
+                <a:solidFill>
+                  <a:schemeClr val="tx1"/>
+                </a:solidFill>
+                <a:latin typeface="Times New Roman" panose="02020603050405020304" pitchFamily="18" charset="0"/>
+              </a:defRPr>
+            </a:lvl7pPr>
+            <a:lvl8pPr marL="3429000" indent="-228600" eaLnBrk="0" fontAlgn="base" hangingPunct="0">
+              <a:spcBef>
+                <a:spcPct val="20000"/>
+              </a:spcBef>
+              <a:spcAft>
+                <a:spcPct val="0"/>
+              </a:spcAft>
+              <a:buChar char="»"/>
+              <a:defRPr sz="2000">
+                <a:solidFill>
+                  <a:schemeClr val="tx1"/>
+                </a:solidFill>
+                <a:latin typeface="Times New Roman" panose="02020603050405020304" pitchFamily="18" charset="0"/>
+              </a:defRPr>
+            </a:lvl8pPr>
+            <a:lvl9pPr marL="3886200" indent="-228600" eaLnBrk="0" fontAlgn="base" hangingPunct="0">
+              <a:spcBef>
+                <a:spcPct val="20000"/>
+              </a:spcBef>
+              <a:spcAft>
+                <a:spcPct val="0"/>
+              </a:spcAft>
+              <a:buChar char="»"/>
+              <a:defRPr sz="2000">
+                <a:solidFill>
+                  <a:schemeClr val="tx1"/>
+                </a:solidFill>
+                <a:latin typeface="Times New Roman" panose="02020603050405020304" pitchFamily="18" charset="0"/>
+              </a:defRPr>
+            </a:lvl9pPr>
+          </a:lstStyle>
+          <a:p>
+            <a:pPr>
+              <a:spcBef>
+                <a:spcPct val="50000"/>
+              </a:spcBef>
+              <a:buFontTx/>
+              <a:buNone/>
+            </a:pPr>
+            <a:r>
+              <a:rPr lang="en-US" altLang="en-US" sz="1600"/>
+              <a:t>doPost(HttpServletRequest, </a:t>
+            </a:r>
+          </a:p>
+          <a:p>
+            <a:pPr>
+              <a:spcBef>
+                <a:spcPct val="50000"/>
+              </a:spcBef>
+              <a:buFontTx/>
+              <a:buNone/>
+            </a:pPr>
+            <a:r>
+              <a:rPr lang="en-US" altLang="en-US" sz="1600"/>
+              <a:t>	HttpServletResponse);</a:t>
+            </a:r>
+          </a:p>
+          <a:p>
+            <a:pPr>
+              <a:spcBef>
+                <a:spcPct val="50000"/>
+              </a:spcBef>
+              <a:buFontTx/>
+              <a:buNone/>
+            </a:pPr>
+            <a:r>
+              <a:rPr lang="en-US" altLang="en-US" sz="1600"/>
+              <a:t>…….</a:t>
+            </a:r>
+          </a:p>
+        </p:txBody>
+      </p:sp>
+      <p:sp>
+        <p:nvSpPr>
+          <p:cNvPr id="20" name="Oval 20"/>
+          <p:cNvSpPr>
+            <a:spLocks noChangeArrowheads="1"/>
+          </p:cNvSpPr>
+          <p:nvPr/>
+        </p:nvSpPr>
+        <p:spPr bwMode="auto">
+          <a:xfrm>
+            <a:off x="5954111" y="3765331"/>
+            <a:ext cx="4495800" cy="2286000"/>
+          </a:xfrm>
+          <a:prstGeom prst="ellipse">
+            <a:avLst/>
+          </a:prstGeom>
+          <a:noFill/>
+          <a:ln w="9525">
+            <a:solidFill>
+              <a:schemeClr val="tx1"/>
+            </a:solidFill>
+            <a:round/>
+            <a:headEnd/>
+            <a:tailEnd/>
+          </a:ln>
+          <a:extLst>
+            <a:ext uri="{909E8E84-426E-40DD-AFC4-6F175D3DCCD1}">
+              <a14:hiddenFill xmlns:a14="http://schemas.microsoft.com/office/drawing/2010/main">
+                <a:solidFill>
+                  <a:srgbClr val="FFFFFF"/>
+                </a:solidFill>
+              </a14:hiddenFill>
+            </a:ext>
+          </a:extLst>
+        </p:spPr>
+        <p:txBody>
+          <a:bodyPr wrap="none" anchor="ctr"/>
+          <a:lstStyle>
+            <a:lvl1pPr>
+              <a:spcBef>
+                <a:spcPct val="20000"/>
+              </a:spcBef>
+              <a:buChar char="•"/>
+              <a:defRPr sz="2800">
+                <a:solidFill>
+                  <a:schemeClr val="tx1"/>
+                </a:solidFill>
+                <a:latin typeface="Times New Roman" panose="02020603050405020304" pitchFamily="18" charset="0"/>
+              </a:defRPr>
+            </a:lvl1pPr>
+            <a:lvl2pPr marL="742950" indent="-285750">
+              <a:spcBef>
+                <a:spcPct val="20000"/>
+              </a:spcBef>
+              <a:buChar char="–"/>
+              <a:defRPr sz="2200">
+                <a:solidFill>
+                  <a:schemeClr val="tx1"/>
+                </a:solidFill>
+                <a:latin typeface="Times New Roman" panose="02020603050405020304" pitchFamily="18" charset="0"/>
+              </a:defRPr>
+            </a:lvl2pPr>
+            <a:lvl3pPr marL="1143000" indent="-228600">
+              <a:spcBef>
+                <a:spcPct val="20000"/>
+              </a:spcBef>
+              <a:buChar char="•"/>
+              <a:defRPr sz="2000">
+                <a:solidFill>
+                  <a:schemeClr val="tx1"/>
+                </a:solidFill>
+                <a:latin typeface="Times New Roman" panose="02020603050405020304" pitchFamily="18" charset="0"/>
+              </a:defRPr>
+            </a:lvl3pPr>
+            <a:lvl4pPr marL="1600200" indent="-228600">
+              <a:spcBef>
+                <a:spcPct val="20000"/>
+              </a:spcBef>
+              <a:buChar char="–"/>
+              <a:defRPr sz="2000">
+                <a:solidFill>
+                  <a:schemeClr val="tx1"/>
+                </a:solidFill>
+                <a:latin typeface="Times New Roman" panose="02020603050405020304" pitchFamily="18" charset="0"/>
+              </a:defRPr>
+            </a:lvl4pPr>
+            <a:lvl5pPr marL="2057400" indent="-228600">
+              <a:spcBef>
+                <a:spcPct val="20000"/>
+              </a:spcBef>
+              <a:buChar char="»"/>
+              <a:defRPr sz="2000">
+                <a:solidFill>
+                  <a:schemeClr val="tx1"/>
+                </a:solidFill>
+                <a:latin typeface="Times New Roman" panose="02020603050405020304" pitchFamily="18" charset="0"/>
+              </a:defRPr>
+            </a:lvl5pPr>
+            <a:lvl6pPr marL="2514600" indent="-228600" eaLnBrk="0" fontAlgn="base" hangingPunct="0">
+              <a:spcBef>
+                <a:spcPct val="20000"/>
+              </a:spcBef>
+              <a:spcAft>
+                <a:spcPct val="0"/>
+              </a:spcAft>
+              <a:buChar char="»"/>
+              <a:defRPr sz="2000">
+                <a:solidFill>
+                  <a:schemeClr val="tx1"/>
+                </a:solidFill>
+                <a:latin typeface="Times New Roman" panose="02020603050405020304" pitchFamily="18" charset="0"/>
+              </a:defRPr>
+            </a:lvl6pPr>
+            <a:lvl7pPr marL="2971800" indent="-228600" eaLnBrk="0" fontAlgn="base" hangingPunct="0">
+              <a:spcBef>
+                <a:spcPct val="20000"/>
+              </a:spcBef>
+              <a:spcAft>
+                <a:spcPct val="0"/>
+              </a:spcAft>
+              <a:buChar char="»"/>
+              <a:defRPr sz="2000">
+                <a:solidFill>
+                  <a:schemeClr val="tx1"/>
+                </a:solidFill>
+                <a:latin typeface="Times New Roman" panose="02020603050405020304" pitchFamily="18" charset="0"/>
+              </a:defRPr>
+            </a:lvl7pPr>
+            <a:lvl8pPr marL="3429000" indent="-228600" eaLnBrk="0" fontAlgn="base" hangingPunct="0">
+              <a:spcBef>
+                <a:spcPct val="20000"/>
+              </a:spcBef>
+              <a:spcAft>
+                <a:spcPct val="0"/>
+              </a:spcAft>
+              <a:buChar char="»"/>
+              <a:defRPr sz="2000">
+                <a:solidFill>
+                  <a:schemeClr val="tx1"/>
+                </a:solidFill>
+                <a:latin typeface="Times New Roman" panose="02020603050405020304" pitchFamily="18" charset="0"/>
+              </a:defRPr>
+            </a:lvl8pPr>
+            <a:lvl9pPr marL="3886200" indent="-228600" eaLnBrk="0" fontAlgn="base" hangingPunct="0">
+              <a:spcBef>
+                <a:spcPct val="20000"/>
+              </a:spcBef>
+              <a:spcAft>
+                <a:spcPct val="0"/>
+              </a:spcAft>
+              <a:buChar char="»"/>
+              <a:defRPr sz="2000">
+                <a:solidFill>
+                  <a:schemeClr val="tx1"/>
+                </a:solidFill>
+                <a:latin typeface="Times New Roman" panose="02020603050405020304" pitchFamily="18" charset="0"/>
+              </a:defRPr>
+            </a:lvl9pPr>
+          </a:lstStyle>
+          <a:p>
+            <a:pPr>
+              <a:spcBef>
+                <a:spcPct val="50000"/>
+              </a:spcBef>
+              <a:buFontTx/>
+              <a:buNone/>
+            </a:pPr>
+            <a:endParaRPr lang="en-US" altLang="en-US" sz="1600"/>
+          </a:p>
+        </p:txBody>
+      </p:sp>
+      <p:sp>
+        <p:nvSpPr>
+          <p:cNvPr id="21" name="AutoShape 25"/>
+          <p:cNvSpPr>
+            <a:spLocks noChangeArrowheads="1"/>
+          </p:cNvSpPr>
+          <p:nvPr/>
+        </p:nvSpPr>
+        <p:spPr bwMode="auto">
+          <a:xfrm>
+            <a:off x="3287111" y="3765331"/>
+            <a:ext cx="333375" cy="381000"/>
+          </a:xfrm>
+          <a:prstGeom prst="downArrow">
+            <a:avLst>
+              <a:gd name="adj1" fmla="val 50000"/>
+              <a:gd name="adj2" fmla="val 28571"/>
+            </a:avLst>
+          </a:prstGeom>
+          <a:solidFill>
+            <a:schemeClr val="accent1"/>
+          </a:solidFill>
+          <a:ln w="9525">
+            <a:solidFill>
+              <a:schemeClr val="tx1"/>
+            </a:solidFill>
+            <a:miter lim="800000"/>
+            <a:headEnd/>
+            <a:tailEnd/>
+          </a:ln>
+        </p:spPr>
+        <p:txBody>
+          <a:bodyPr wrap="none" anchor="ctr"/>
+          <a:lstStyle>
+            <a:lvl1pPr>
+              <a:spcBef>
+                <a:spcPct val="20000"/>
+              </a:spcBef>
+              <a:buChar char="•"/>
+              <a:defRPr sz="2800">
+                <a:solidFill>
+                  <a:schemeClr val="tx1"/>
+                </a:solidFill>
+                <a:latin typeface="Times New Roman" panose="02020603050405020304" pitchFamily="18" charset="0"/>
+              </a:defRPr>
+            </a:lvl1pPr>
+            <a:lvl2pPr marL="742950" indent="-285750">
+              <a:spcBef>
+                <a:spcPct val="20000"/>
+              </a:spcBef>
+              <a:buChar char="–"/>
+              <a:defRPr sz="2200">
+                <a:solidFill>
+                  <a:schemeClr val="tx1"/>
+                </a:solidFill>
+                <a:latin typeface="Times New Roman" panose="02020603050405020304" pitchFamily="18" charset="0"/>
+              </a:defRPr>
+            </a:lvl2pPr>
+            <a:lvl3pPr marL="1143000" indent="-228600">
+              <a:spcBef>
+                <a:spcPct val="20000"/>
+              </a:spcBef>
+              <a:buChar char="•"/>
+              <a:defRPr sz="2000">
+                <a:solidFill>
+                  <a:schemeClr val="tx1"/>
+                </a:solidFill>
+                <a:latin typeface="Times New Roman" panose="02020603050405020304" pitchFamily="18" charset="0"/>
+              </a:defRPr>
+            </a:lvl3pPr>
+            <a:lvl4pPr marL="1600200" indent="-228600">
+              <a:spcBef>
+                <a:spcPct val="20000"/>
+              </a:spcBef>
+              <a:buChar char="–"/>
+              <a:defRPr sz="2000">
+                <a:solidFill>
+                  <a:schemeClr val="tx1"/>
+                </a:solidFill>
+                <a:latin typeface="Times New Roman" panose="02020603050405020304" pitchFamily="18" charset="0"/>
+              </a:defRPr>
+            </a:lvl4pPr>
+            <a:lvl5pPr marL="2057400" indent="-228600">
+              <a:spcBef>
+                <a:spcPct val="20000"/>
+              </a:spcBef>
+              <a:buChar char="»"/>
+              <a:defRPr sz="2000">
+                <a:solidFill>
+                  <a:schemeClr val="tx1"/>
+                </a:solidFill>
+                <a:latin typeface="Times New Roman" panose="02020603050405020304" pitchFamily="18" charset="0"/>
+              </a:defRPr>
+            </a:lvl5pPr>
+            <a:lvl6pPr marL="2514600" indent="-228600" eaLnBrk="0" fontAlgn="base" hangingPunct="0">
+              <a:spcBef>
+                <a:spcPct val="20000"/>
+              </a:spcBef>
+              <a:spcAft>
+                <a:spcPct val="0"/>
+              </a:spcAft>
+              <a:buChar char="»"/>
+              <a:defRPr sz="2000">
+                <a:solidFill>
+                  <a:schemeClr val="tx1"/>
+                </a:solidFill>
+                <a:latin typeface="Times New Roman" panose="02020603050405020304" pitchFamily="18" charset="0"/>
+              </a:defRPr>
+            </a:lvl6pPr>
+            <a:lvl7pPr marL="2971800" indent="-228600" eaLnBrk="0" fontAlgn="base" hangingPunct="0">
+              <a:spcBef>
+                <a:spcPct val="20000"/>
+              </a:spcBef>
+              <a:spcAft>
+                <a:spcPct val="0"/>
+              </a:spcAft>
+              <a:buChar char="»"/>
+              <a:defRPr sz="2000">
+                <a:solidFill>
+                  <a:schemeClr val="tx1"/>
+                </a:solidFill>
+                <a:latin typeface="Times New Roman" panose="02020603050405020304" pitchFamily="18" charset="0"/>
+              </a:defRPr>
+            </a:lvl7pPr>
+            <a:lvl8pPr marL="3429000" indent="-228600" eaLnBrk="0" fontAlgn="base" hangingPunct="0">
+              <a:spcBef>
+                <a:spcPct val="20000"/>
+              </a:spcBef>
+              <a:spcAft>
+                <a:spcPct val="0"/>
+              </a:spcAft>
+              <a:buChar char="»"/>
+              <a:defRPr sz="2000">
+                <a:solidFill>
+                  <a:schemeClr val="tx1"/>
+                </a:solidFill>
+                <a:latin typeface="Times New Roman" panose="02020603050405020304" pitchFamily="18" charset="0"/>
+              </a:defRPr>
+            </a:lvl8pPr>
+            <a:lvl9pPr marL="3886200" indent="-228600" eaLnBrk="0" fontAlgn="base" hangingPunct="0">
+              <a:spcBef>
+                <a:spcPct val="20000"/>
+              </a:spcBef>
+              <a:spcAft>
+                <a:spcPct val="0"/>
+              </a:spcAft>
+              <a:buChar char="»"/>
+              <a:defRPr sz="2000">
+                <a:solidFill>
+                  <a:schemeClr val="tx1"/>
+                </a:solidFill>
+                <a:latin typeface="Times New Roman" panose="02020603050405020304" pitchFamily="18" charset="0"/>
+              </a:defRPr>
+            </a:lvl9pPr>
+          </a:lstStyle>
+          <a:p>
+            <a:pPr>
+              <a:spcBef>
+                <a:spcPct val="50000"/>
+              </a:spcBef>
+              <a:buFontTx/>
+              <a:buNone/>
+            </a:pPr>
+            <a:endParaRPr lang="en-US" altLang="en-US" sz="1600"/>
+          </a:p>
+        </p:txBody>
+      </p:sp>
+      <p:sp>
+        <p:nvSpPr>
+          <p:cNvPr id="22" name="AutoShape 26"/>
+          <p:cNvSpPr>
+            <a:spLocks noChangeArrowheads="1"/>
+          </p:cNvSpPr>
+          <p:nvPr/>
+        </p:nvSpPr>
+        <p:spPr bwMode="auto">
+          <a:xfrm>
+            <a:off x="3287111" y="5060731"/>
+            <a:ext cx="333375" cy="304800"/>
+          </a:xfrm>
+          <a:prstGeom prst="downArrow">
+            <a:avLst>
+              <a:gd name="adj1" fmla="val 50000"/>
+              <a:gd name="adj2" fmla="val 25000"/>
+            </a:avLst>
+          </a:prstGeom>
+          <a:solidFill>
+            <a:schemeClr val="accent1"/>
+          </a:solidFill>
+          <a:ln w="9525">
+            <a:solidFill>
+              <a:schemeClr val="tx1"/>
+            </a:solidFill>
+            <a:miter lim="800000"/>
+            <a:headEnd/>
+            <a:tailEnd/>
+          </a:ln>
+        </p:spPr>
+        <p:txBody>
+          <a:bodyPr wrap="none" anchor="ctr"/>
+          <a:lstStyle>
+            <a:lvl1pPr>
+              <a:spcBef>
+                <a:spcPct val="20000"/>
+              </a:spcBef>
+              <a:buChar char="•"/>
+              <a:defRPr sz="2800">
+                <a:solidFill>
+                  <a:schemeClr val="tx1"/>
+                </a:solidFill>
+                <a:latin typeface="Times New Roman" panose="02020603050405020304" pitchFamily="18" charset="0"/>
+              </a:defRPr>
+            </a:lvl1pPr>
+            <a:lvl2pPr marL="742950" indent="-285750">
+              <a:spcBef>
+                <a:spcPct val="20000"/>
+              </a:spcBef>
+              <a:buChar char="–"/>
+              <a:defRPr sz="2200">
+                <a:solidFill>
+                  <a:schemeClr val="tx1"/>
+                </a:solidFill>
+                <a:latin typeface="Times New Roman" panose="02020603050405020304" pitchFamily="18" charset="0"/>
+              </a:defRPr>
+            </a:lvl2pPr>
+            <a:lvl3pPr marL="1143000" indent="-228600">
+              <a:spcBef>
+                <a:spcPct val="20000"/>
+              </a:spcBef>
+              <a:buChar char="•"/>
+              <a:defRPr sz="2000">
+                <a:solidFill>
+                  <a:schemeClr val="tx1"/>
+                </a:solidFill>
+                <a:latin typeface="Times New Roman" panose="02020603050405020304" pitchFamily="18" charset="0"/>
+              </a:defRPr>
+            </a:lvl3pPr>
+            <a:lvl4pPr marL="1600200" indent="-228600">
+              <a:spcBef>
+                <a:spcPct val="20000"/>
+              </a:spcBef>
+              <a:buChar char="–"/>
+              <a:defRPr sz="2000">
+                <a:solidFill>
+                  <a:schemeClr val="tx1"/>
+                </a:solidFill>
+                <a:latin typeface="Times New Roman" panose="02020603050405020304" pitchFamily="18" charset="0"/>
+              </a:defRPr>
+            </a:lvl4pPr>
+            <a:lvl5pPr marL="2057400" indent="-228600">
+              <a:spcBef>
+                <a:spcPct val="20000"/>
+              </a:spcBef>
+              <a:buChar char="»"/>
+              <a:defRPr sz="2000">
+                <a:solidFill>
+                  <a:schemeClr val="tx1"/>
+                </a:solidFill>
+                <a:latin typeface="Times New Roman" panose="02020603050405020304" pitchFamily="18" charset="0"/>
+              </a:defRPr>
+            </a:lvl5pPr>
+            <a:lvl6pPr marL="2514600" indent="-228600" eaLnBrk="0" fontAlgn="base" hangingPunct="0">
+              <a:spcBef>
+                <a:spcPct val="20000"/>
+              </a:spcBef>
+              <a:spcAft>
+                <a:spcPct val="0"/>
+              </a:spcAft>
+              <a:buChar char="»"/>
+              <a:defRPr sz="2000">
+                <a:solidFill>
+                  <a:schemeClr val="tx1"/>
+                </a:solidFill>
+                <a:latin typeface="Times New Roman" panose="02020603050405020304" pitchFamily="18" charset="0"/>
+              </a:defRPr>
+            </a:lvl6pPr>
+            <a:lvl7pPr marL="2971800" indent="-228600" eaLnBrk="0" fontAlgn="base" hangingPunct="0">
+              <a:spcBef>
+                <a:spcPct val="20000"/>
+              </a:spcBef>
+              <a:spcAft>
+                <a:spcPct val="0"/>
+              </a:spcAft>
+              <a:buChar char="»"/>
+              <a:defRPr sz="2000">
+                <a:solidFill>
+                  <a:schemeClr val="tx1"/>
+                </a:solidFill>
+                <a:latin typeface="Times New Roman" panose="02020603050405020304" pitchFamily="18" charset="0"/>
+              </a:defRPr>
+            </a:lvl7pPr>
+            <a:lvl8pPr marL="3429000" indent="-228600" eaLnBrk="0" fontAlgn="base" hangingPunct="0">
+              <a:spcBef>
+                <a:spcPct val="20000"/>
+              </a:spcBef>
+              <a:spcAft>
+                <a:spcPct val="0"/>
+              </a:spcAft>
+              <a:buChar char="»"/>
+              <a:defRPr sz="2000">
+                <a:solidFill>
+                  <a:schemeClr val="tx1"/>
+                </a:solidFill>
+                <a:latin typeface="Times New Roman" panose="02020603050405020304" pitchFamily="18" charset="0"/>
+              </a:defRPr>
+            </a:lvl8pPr>
+            <a:lvl9pPr marL="3886200" indent="-228600" eaLnBrk="0" fontAlgn="base" hangingPunct="0">
+              <a:spcBef>
+                <a:spcPct val="20000"/>
+              </a:spcBef>
+              <a:spcAft>
+                <a:spcPct val="0"/>
+              </a:spcAft>
+              <a:buChar char="»"/>
+              <a:defRPr sz="2000">
+                <a:solidFill>
+                  <a:schemeClr val="tx1"/>
+                </a:solidFill>
+                <a:latin typeface="Times New Roman" panose="02020603050405020304" pitchFamily="18" charset="0"/>
+              </a:defRPr>
+            </a:lvl9pPr>
+          </a:lstStyle>
+          <a:p>
+            <a:pPr>
+              <a:spcBef>
+                <a:spcPct val="50000"/>
+              </a:spcBef>
+              <a:buFontTx/>
+              <a:buNone/>
+            </a:pPr>
+            <a:endParaRPr lang="en-US" altLang="en-US" sz="1600"/>
+          </a:p>
+        </p:txBody>
+      </p:sp>
+      <p:sp>
+        <p:nvSpPr>
+          <p:cNvPr id="23" name="Line 27"/>
+          <p:cNvSpPr>
+            <a:spLocks noChangeShapeType="1"/>
+          </p:cNvSpPr>
+          <p:nvPr/>
+        </p:nvSpPr>
+        <p:spPr bwMode="auto">
+          <a:xfrm>
+            <a:off x="5115911" y="4603531"/>
+            <a:ext cx="838200" cy="0"/>
+          </a:xfrm>
+          <a:prstGeom prst="line">
+            <a:avLst/>
+          </a:prstGeom>
+          <a:noFill/>
+          <a:ln w="12700">
+            <a:solidFill>
+              <a:schemeClr val="tx1"/>
+            </a:solidFill>
+            <a:round/>
+            <a:headEnd/>
+            <a:tailEnd type="triangle" w="med" len="med"/>
+          </a:ln>
+          <a:extLst>
+            <a:ext uri="{909E8E84-426E-40DD-AFC4-6F175D3DCCD1}">
+              <a14:hiddenFill xmlns:a14="http://schemas.microsoft.com/office/drawing/2010/main">
+                <a:noFill/>
+              </a14:hiddenFill>
+            </a:ext>
+          </a:extLst>
+        </p:spPr>
+        <p:txBody>
+          <a:bodyPr wrap="none" anchor="ctr"/>
+          <a:lstStyle/>
+          <a:p>
+            <a:endParaRPr lang="en-US"/>
+          </a:p>
+        </p:txBody>
+      </p:sp>
+      <p:sp>
+        <p:nvSpPr>
+          <p:cNvPr id="24" name="Rectangle 28"/>
+          <p:cNvSpPr>
+            <a:spLocks noChangeArrowheads="1"/>
+          </p:cNvSpPr>
+          <p:nvPr/>
+        </p:nvSpPr>
+        <p:spPr bwMode="auto">
+          <a:xfrm>
+            <a:off x="1839311" y="3003331"/>
+            <a:ext cx="3352800" cy="3276600"/>
+          </a:xfrm>
+          <a:prstGeom prst="rect">
+            <a:avLst/>
+          </a:prstGeom>
+          <a:noFill/>
+          <a:ln w="9525">
+            <a:solidFill>
+              <a:schemeClr val="tx1"/>
+            </a:solidFill>
+            <a:miter lim="800000"/>
+            <a:headEnd/>
+            <a:tailEnd/>
+          </a:ln>
+          <a:extLst>
+            <a:ext uri="{909E8E84-426E-40DD-AFC4-6F175D3DCCD1}">
+              <a14:hiddenFill xmlns:a14="http://schemas.microsoft.com/office/drawing/2010/main">
+                <a:solidFill>
+                  <a:srgbClr val="FFFFFF"/>
+                </a:solidFill>
+              </a14:hiddenFill>
+            </a:ext>
+          </a:extLst>
+        </p:spPr>
+        <p:txBody>
+          <a:bodyPr wrap="none" anchor="ctr"/>
+          <a:lstStyle>
+            <a:lvl1pPr>
+              <a:spcBef>
+                <a:spcPct val="20000"/>
+              </a:spcBef>
+              <a:buChar char="•"/>
+              <a:defRPr sz="2800">
+                <a:solidFill>
+                  <a:schemeClr val="tx1"/>
+                </a:solidFill>
+                <a:latin typeface="Times New Roman" panose="02020603050405020304" pitchFamily="18" charset="0"/>
+              </a:defRPr>
+            </a:lvl1pPr>
+            <a:lvl2pPr marL="742950" indent="-285750">
+              <a:spcBef>
+                <a:spcPct val="20000"/>
+              </a:spcBef>
+              <a:buChar char="–"/>
+              <a:defRPr sz="2200">
+                <a:solidFill>
+                  <a:schemeClr val="tx1"/>
+                </a:solidFill>
+                <a:latin typeface="Times New Roman" panose="02020603050405020304" pitchFamily="18" charset="0"/>
+              </a:defRPr>
+            </a:lvl2pPr>
+            <a:lvl3pPr marL="1143000" indent="-228600">
+              <a:spcBef>
+                <a:spcPct val="20000"/>
+              </a:spcBef>
+              <a:buChar char="•"/>
+              <a:defRPr sz="2000">
+                <a:solidFill>
+                  <a:schemeClr val="tx1"/>
+                </a:solidFill>
+                <a:latin typeface="Times New Roman" panose="02020603050405020304" pitchFamily="18" charset="0"/>
+              </a:defRPr>
+            </a:lvl3pPr>
+            <a:lvl4pPr marL="1600200" indent="-228600">
+              <a:spcBef>
+                <a:spcPct val="20000"/>
+              </a:spcBef>
+              <a:buChar char="–"/>
+              <a:defRPr sz="2000">
+                <a:solidFill>
+                  <a:schemeClr val="tx1"/>
+                </a:solidFill>
+                <a:latin typeface="Times New Roman" panose="02020603050405020304" pitchFamily="18" charset="0"/>
+              </a:defRPr>
+            </a:lvl4pPr>
+            <a:lvl5pPr marL="2057400" indent="-228600">
+              <a:spcBef>
+                <a:spcPct val="20000"/>
+              </a:spcBef>
+              <a:buChar char="»"/>
+              <a:defRPr sz="2000">
+                <a:solidFill>
+                  <a:schemeClr val="tx1"/>
+                </a:solidFill>
+                <a:latin typeface="Times New Roman" panose="02020603050405020304" pitchFamily="18" charset="0"/>
+              </a:defRPr>
+            </a:lvl5pPr>
+            <a:lvl6pPr marL="2514600" indent="-228600" eaLnBrk="0" fontAlgn="base" hangingPunct="0">
+              <a:spcBef>
+                <a:spcPct val="20000"/>
+              </a:spcBef>
+              <a:spcAft>
+                <a:spcPct val="0"/>
+              </a:spcAft>
+              <a:buChar char="»"/>
+              <a:defRPr sz="2000">
+                <a:solidFill>
+                  <a:schemeClr val="tx1"/>
+                </a:solidFill>
+                <a:latin typeface="Times New Roman" panose="02020603050405020304" pitchFamily="18" charset="0"/>
+              </a:defRPr>
+            </a:lvl6pPr>
+            <a:lvl7pPr marL="2971800" indent="-228600" eaLnBrk="0" fontAlgn="base" hangingPunct="0">
+              <a:spcBef>
+                <a:spcPct val="20000"/>
+              </a:spcBef>
+              <a:spcAft>
+                <a:spcPct val="0"/>
+              </a:spcAft>
+              <a:buChar char="»"/>
+              <a:defRPr sz="2000">
+                <a:solidFill>
+                  <a:schemeClr val="tx1"/>
+                </a:solidFill>
+                <a:latin typeface="Times New Roman" panose="02020603050405020304" pitchFamily="18" charset="0"/>
+              </a:defRPr>
+            </a:lvl7pPr>
+            <a:lvl8pPr marL="3429000" indent="-228600" eaLnBrk="0" fontAlgn="base" hangingPunct="0">
+              <a:spcBef>
+                <a:spcPct val="20000"/>
+              </a:spcBef>
+              <a:spcAft>
+                <a:spcPct val="0"/>
+              </a:spcAft>
+              <a:buChar char="»"/>
+              <a:defRPr sz="2000">
+                <a:solidFill>
+                  <a:schemeClr val="tx1"/>
+                </a:solidFill>
+                <a:latin typeface="Times New Roman" panose="02020603050405020304" pitchFamily="18" charset="0"/>
+              </a:defRPr>
+            </a:lvl8pPr>
+            <a:lvl9pPr marL="3886200" indent="-228600" eaLnBrk="0" fontAlgn="base" hangingPunct="0">
+              <a:spcBef>
+                <a:spcPct val="20000"/>
+              </a:spcBef>
+              <a:spcAft>
+                <a:spcPct val="0"/>
+              </a:spcAft>
+              <a:buChar char="»"/>
+              <a:defRPr sz="2000">
+                <a:solidFill>
+                  <a:schemeClr val="tx1"/>
+                </a:solidFill>
+                <a:latin typeface="Times New Roman" panose="02020603050405020304" pitchFamily="18" charset="0"/>
+              </a:defRPr>
+            </a:lvl9pPr>
+          </a:lstStyle>
+          <a:p>
+            <a:pPr>
+              <a:spcBef>
+                <a:spcPct val="50000"/>
+              </a:spcBef>
+              <a:buFontTx/>
+              <a:buNone/>
+            </a:pPr>
+            <a:endParaRPr lang="en-US" altLang="en-US" sz="1600"/>
+          </a:p>
+        </p:txBody>
+      </p:sp>
+    </p:spTree>
+    <p:extLst>
+      <p:ext uri="{BB962C8B-B14F-4D97-AF65-F5344CB8AC3E}">
+        <p14:creationId xmlns:p14="http://schemas.microsoft.com/office/powerpoint/2010/main" val="3920513288"/>
+      </p:ext>
+    </p:extLst>
+  </p:cSld>
+  <p:clrMapOvr>
+    <a:masterClrMapping/>
+  </p:clrMapOvr>
+</p:sld>
+</file>
+
 <file path=ppt/slides/slide5.xml><?xml version="1.0" encoding="utf-8"?>
 <p:sld xmlns:a="http://schemas.openxmlformats.org/drawingml/2006/main" xmlns:r="http://schemas.openxmlformats.org/officeDocument/2006/relationships" xmlns:p="http://schemas.openxmlformats.org/presentationml/2006/main">
   <p:cSld>
@@ -9162,6 +12519,1194 @@
     <p:extLst>
       <p:ext uri="{BB962C8B-B14F-4D97-AF65-F5344CB8AC3E}">
         <p14:creationId xmlns:p14="http://schemas.microsoft.com/office/powerpoint/2010/main" val="2883238511"/>
+      </p:ext>
+    </p:extLst>
+  </p:cSld>
+  <p:clrMapOvr>
+    <a:masterClrMapping/>
+  </p:clrMapOvr>
+</p:sld>
+</file>
+
+<file path=ppt/slides/slide50.xml><?xml version="1.0" encoding="utf-8"?>
+<p:sld xmlns:a="http://schemas.openxmlformats.org/drawingml/2006/main" xmlns:r="http://schemas.openxmlformats.org/officeDocument/2006/relationships" xmlns:p="http://schemas.openxmlformats.org/presentationml/2006/main">
+  <p:cSld>
+    <p:spTree>
+      <p:nvGrpSpPr>
+        <p:cNvPr id="1" name=""/>
+        <p:cNvGrpSpPr/>
+        <p:nvPr/>
+      </p:nvGrpSpPr>
+      <p:grpSpPr>
+        <a:xfrm>
+          <a:off x="0" y="0"/>
+          <a:ext cx="0" cy="0"/>
+          <a:chOff x="0" y="0"/>
+          <a:chExt cx="0" cy="0"/>
+        </a:xfrm>
+      </p:grpSpPr>
+      <p:sp>
+        <p:nvSpPr>
+          <p:cNvPr id="2" name="Title 1"/>
+          <p:cNvSpPr>
+            <a:spLocks noGrp="1"/>
+          </p:cNvSpPr>
+          <p:nvPr>
+            <p:ph type="title"/>
+          </p:nvPr>
+        </p:nvSpPr>
+        <p:spPr/>
+        <p:txBody>
+          <a:bodyPr/>
+          <a:lstStyle/>
+          <a:p>
+            <a:r>
+              <a:rPr lang="en-US" dirty="0" smtClean="0"/>
+              <a:t>Servlet container folder structure</a:t>
+            </a:r>
+            <a:endParaRPr lang="en-US" dirty="0"/>
+          </a:p>
+        </p:txBody>
+      </p:sp>
+      <p:pic>
+        <p:nvPicPr>
+          <p:cNvPr id="5122" name="Picture 2" descr="Image result for servlet web.xml structure"/>
+          <p:cNvPicPr>
+            <a:picLocks noChangeAspect="1" noChangeArrowheads="1"/>
+          </p:cNvPicPr>
+          <p:nvPr/>
+        </p:nvPicPr>
+        <p:blipFill>
+          <a:blip r:embed="rId2">
+            <a:extLst>
+              <a:ext uri="{28A0092B-C50C-407E-A947-70E740481C1C}">
+                <a14:useLocalDpi xmlns:a14="http://schemas.microsoft.com/office/drawing/2010/main" val="0"/>
+              </a:ext>
+            </a:extLst>
+          </a:blip>
+          <a:srcRect/>
+          <a:stretch>
+            <a:fillRect/>
+          </a:stretch>
+        </p:blipFill>
+        <p:spPr bwMode="auto">
+          <a:xfrm>
+            <a:off x="2352237" y="1551752"/>
+            <a:ext cx="6305550" cy="5124451"/>
+          </a:xfrm>
+          <a:prstGeom prst="rect">
+            <a:avLst/>
+          </a:prstGeom>
+          <a:noFill/>
+          <a:extLst>
+            <a:ext uri="{909E8E84-426E-40DD-AFC4-6F175D3DCCD1}">
+              <a14:hiddenFill xmlns:a14="http://schemas.microsoft.com/office/drawing/2010/main">
+                <a:solidFill>
+                  <a:srgbClr val="FFFFFF"/>
+                </a:solidFill>
+              </a14:hiddenFill>
+            </a:ext>
+          </a:extLst>
+        </p:spPr>
+      </p:pic>
+    </p:spTree>
+    <p:extLst>
+      <p:ext uri="{BB962C8B-B14F-4D97-AF65-F5344CB8AC3E}">
+        <p14:creationId xmlns:p14="http://schemas.microsoft.com/office/powerpoint/2010/main" val="3479645685"/>
+      </p:ext>
+    </p:extLst>
+  </p:cSld>
+  <p:clrMapOvr>
+    <a:masterClrMapping/>
+  </p:clrMapOvr>
+</p:sld>
+</file>
+
+<file path=ppt/slides/slide51.xml><?xml version="1.0" encoding="utf-8"?>
+<p:sld xmlns:a="http://schemas.openxmlformats.org/drawingml/2006/main" xmlns:r="http://schemas.openxmlformats.org/officeDocument/2006/relationships" xmlns:p="http://schemas.openxmlformats.org/presentationml/2006/main">
+  <p:cSld>
+    <p:spTree>
+      <p:nvGrpSpPr>
+        <p:cNvPr id="1" name=""/>
+        <p:cNvGrpSpPr/>
+        <p:nvPr/>
+      </p:nvGrpSpPr>
+      <p:grpSpPr>
+        <a:xfrm>
+          <a:off x="0" y="0"/>
+          <a:ext cx="0" cy="0"/>
+          <a:chOff x="0" y="0"/>
+          <a:chExt cx="0" cy="0"/>
+        </a:xfrm>
+      </p:grpSpPr>
+      <p:sp>
+        <p:nvSpPr>
+          <p:cNvPr id="2" name="Title 1"/>
+          <p:cNvSpPr>
+            <a:spLocks noGrp="1"/>
+          </p:cNvSpPr>
+          <p:nvPr>
+            <p:ph type="title"/>
+          </p:nvPr>
+        </p:nvSpPr>
+        <p:spPr>
+          <a:xfrm>
+            <a:off x="838199" y="365125"/>
+            <a:ext cx="11070021" cy="1325563"/>
+          </a:xfrm>
+        </p:spPr>
+        <p:txBody>
+          <a:bodyPr/>
+          <a:lstStyle/>
+          <a:p>
+            <a:r>
+              <a:rPr lang="en-US" dirty="0" smtClean="0"/>
+              <a:t>Servlets – How multiple request, response gets handled</a:t>
+            </a:r>
+            <a:endParaRPr lang="en-US" dirty="0"/>
+          </a:p>
+        </p:txBody>
+      </p:sp>
+      <p:sp>
+        <p:nvSpPr>
+          <p:cNvPr id="3" name="Content Placeholder 2"/>
+          <p:cNvSpPr>
+            <a:spLocks noGrp="1"/>
+          </p:cNvSpPr>
+          <p:nvPr>
+            <p:ph idx="1"/>
+          </p:nvPr>
+        </p:nvSpPr>
+        <p:spPr>
+          <a:xfrm>
+            <a:off x="838200" y="2343807"/>
+            <a:ext cx="10515600" cy="3833156"/>
+          </a:xfrm>
+        </p:spPr>
+        <p:txBody>
+          <a:bodyPr/>
+          <a:lstStyle/>
+          <a:p>
+            <a:r>
+              <a:rPr lang="en-US" dirty="0" smtClean="0"/>
+              <a:t>Inside the web (servlet) container, we have a special file called deployment descriptor (web.xml)</a:t>
+            </a:r>
+          </a:p>
+          <a:p>
+            <a:endParaRPr lang="en-US" dirty="0"/>
+          </a:p>
+          <a:p>
+            <a:r>
+              <a:rPr lang="en-US" dirty="0" smtClean="0"/>
+              <a:t>Inside web.xml,  we define, for which request which servlet should be called.  </a:t>
+            </a:r>
+            <a:endParaRPr lang="en-US" dirty="0"/>
+          </a:p>
+        </p:txBody>
+      </p:sp>
+    </p:spTree>
+    <p:extLst>
+      <p:ext uri="{BB962C8B-B14F-4D97-AF65-F5344CB8AC3E}">
+        <p14:creationId xmlns:p14="http://schemas.microsoft.com/office/powerpoint/2010/main" val="4143908894"/>
+      </p:ext>
+    </p:extLst>
+  </p:cSld>
+  <p:clrMapOvr>
+    <a:masterClrMapping/>
+  </p:clrMapOvr>
+</p:sld>
+</file>
+
+<file path=ppt/slides/slide52.xml><?xml version="1.0" encoding="utf-8"?>
+<p:sld xmlns:a="http://schemas.openxmlformats.org/drawingml/2006/main" xmlns:r="http://schemas.openxmlformats.org/officeDocument/2006/relationships" xmlns:p="http://schemas.openxmlformats.org/presentationml/2006/main">
+  <p:cSld>
+    <p:spTree>
+      <p:nvGrpSpPr>
+        <p:cNvPr id="1" name=""/>
+        <p:cNvGrpSpPr/>
+        <p:nvPr/>
+      </p:nvGrpSpPr>
+      <p:grpSpPr>
+        <a:xfrm>
+          <a:off x="0" y="0"/>
+          <a:ext cx="0" cy="0"/>
+          <a:chOff x="0" y="0"/>
+          <a:chExt cx="0" cy="0"/>
+        </a:xfrm>
+      </p:grpSpPr>
+      <p:sp>
+        <p:nvSpPr>
+          <p:cNvPr id="2" name="Title 1"/>
+          <p:cNvSpPr>
+            <a:spLocks noGrp="1"/>
+          </p:cNvSpPr>
+          <p:nvPr>
+            <p:ph type="title"/>
+          </p:nvPr>
+        </p:nvSpPr>
+        <p:spPr/>
+        <p:txBody>
+          <a:bodyPr/>
+          <a:lstStyle/>
+          <a:p>
+            <a:r>
+              <a:rPr lang="en-US" dirty="0" smtClean="0"/>
+              <a:t>Web.xml</a:t>
+            </a:r>
+            <a:endParaRPr lang="en-US" dirty="0"/>
+          </a:p>
+        </p:txBody>
+      </p:sp>
+      <p:pic>
+        <p:nvPicPr>
+          <p:cNvPr id="4" name="Picture 3"/>
+          <p:cNvPicPr>
+            <a:picLocks noChangeAspect="1"/>
+          </p:cNvPicPr>
+          <p:nvPr/>
+        </p:nvPicPr>
+        <p:blipFill>
+          <a:blip r:embed="rId2"/>
+          <a:stretch>
+            <a:fillRect/>
+          </a:stretch>
+        </p:blipFill>
+        <p:spPr>
+          <a:xfrm>
+            <a:off x="986166" y="1853926"/>
+            <a:ext cx="9210675" cy="3990975"/>
+          </a:xfrm>
+          <a:prstGeom prst="rect">
+            <a:avLst/>
+          </a:prstGeom>
+        </p:spPr>
+      </p:pic>
+    </p:spTree>
+    <p:extLst>
+      <p:ext uri="{BB962C8B-B14F-4D97-AF65-F5344CB8AC3E}">
+        <p14:creationId xmlns:p14="http://schemas.microsoft.com/office/powerpoint/2010/main" val="2372892857"/>
+      </p:ext>
+    </p:extLst>
+  </p:cSld>
+  <p:clrMapOvr>
+    <a:masterClrMapping/>
+  </p:clrMapOvr>
+</p:sld>
+</file>
+
+<file path=ppt/slides/slide53.xml><?xml version="1.0" encoding="utf-8"?>
+<p:sld xmlns:a="http://schemas.openxmlformats.org/drawingml/2006/main" xmlns:r="http://schemas.openxmlformats.org/officeDocument/2006/relationships" xmlns:p="http://schemas.openxmlformats.org/presentationml/2006/main">
+  <p:cSld>
+    <p:spTree>
+      <p:nvGrpSpPr>
+        <p:cNvPr id="1" name=""/>
+        <p:cNvGrpSpPr/>
+        <p:nvPr/>
+      </p:nvGrpSpPr>
+      <p:grpSpPr>
+        <a:xfrm>
+          <a:off x="0" y="0"/>
+          <a:ext cx="0" cy="0"/>
+          <a:chOff x="0" y="0"/>
+          <a:chExt cx="0" cy="0"/>
+        </a:xfrm>
+      </p:grpSpPr>
+      <p:sp>
+        <p:nvSpPr>
+          <p:cNvPr id="2" name="Title 1"/>
+          <p:cNvSpPr>
+            <a:spLocks noGrp="1"/>
+          </p:cNvSpPr>
+          <p:nvPr>
+            <p:ph type="title"/>
+          </p:nvPr>
+        </p:nvSpPr>
+        <p:spPr/>
+        <p:txBody>
+          <a:bodyPr/>
+          <a:lstStyle/>
+          <a:p>
+            <a:r>
+              <a:rPr lang="en-US" dirty="0" err="1" smtClean="0"/>
+              <a:t>HttpServlet</a:t>
+            </a:r>
+            <a:endParaRPr lang="en-US" dirty="0"/>
+          </a:p>
+        </p:txBody>
+      </p:sp>
+      <p:sp>
+        <p:nvSpPr>
+          <p:cNvPr id="3" name="Content Placeholder 2"/>
+          <p:cNvSpPr>
+            <a:spLocks noGrp="1"/>
+          </p:cNvSpPr>
+          <p:nvPr>
+            <p:ph idx="1"/>
+          </p:nvPr>
+        </p:nvSpPr>
+        <p:spPr>
+          <a:xfrm>
+            <a:off x="838200" y="1825624"/>
+            <a:ext cx="10933386" cy="4753851"/>
+          </a:xfrm>
+        </p:spPr>
+        <p:txBody>
+          <a:bodyPr/>
+          <a:lstStyle/>
+          <a:p>
+            <a:pPr lvl="1"/>
+            <a:r>
+              <a:rPr lang="en-US" altLang="en-US" dirty="0" smtClean="0"/>
+              <a:t>Base </a:t>
+            </a:r>
+            <a:r>
+              <a:rPr lang="en-US" altLang="en-US" dirty="0"/>
+              <a:t>class for web-based servlets</a:t>
+            </a:r>
+          </a:p>
+          <a:p>
+            <a:pPr lvl="1"/>
+            <a:r>
+              <a:rPr lang="en-US" altLang="en-US" dirty="0" smtClean="0"/>
+              <a:t>Overrides method </a:t>
+            </a:r>
+            <a:r>
+              <a:rPr lang="en-US" altLang="en-US" b="1" dirty="0" smtClean="0"/>
+              <a:t>void</a:t>
+            </a:r>
+            <a:r>
+              <a:rPr lang="en-US" altLang="en-US" dirty="0" smtClean="0"/>
+              <a:t> </a:t>
+            </a:r>
+            <a:r>
+              <a:rPr lang="en-US" altLang="en-US" b="1" dirty="0" smtClean="0">
+                <a:latin typeface="Courier New" panose="02070309020205020404" pitchFamily="49" charset="0"/>
+              </a:rPr>
+              <a:t>service ()</a:t>
+            </a:r>
+          </a:p>
+          <a:p>
+            <a:pPr lvl="2"/>
+            <a:r>
+              <a:rPr lang="en-US" altLang="en-US" dirty="0" smtClean="0"/>
+              <a:t>Request </a:t>
+            </a:r>
+            <a:r>
+              <a:rPr lang="en-US" altLang="en-US" dirty="0"/>
+              <a:t>methods:</a:t>
+            </a:r>
+          </a:p>
+          <a:p>
+            <a:pPr lvl="3"/>
+            <a:r>
+              <a:rPr lang="en-US" altLang="en-US" b="1" dirty="0">
+                <a:latin typeface="Courier New" panose="02070309020205020404" pitchFamily="49" charset="0"/>
+              </a:rPr>
+              <a:t>GET</a:t>
+            </a:r>
+            <a:endParaRPr lang="en-US" altLang="en-US" dirty="0"/>
+          </a:p>
+          <a:p>
+            <a:pPr lvl="3"/>
+            <a:r>
+              <a:rPr lang="en-US" altLang="en-US" b="1" dirty="0">
+                <a:latin typeface="Courier New" panose="02070309020205020404" pitchFamily="49" charset="0"/>
+              </a:rPr>
+              <a:t>POST</a:t>
+            </a:r>
+            <a:endParaRPr lang="en-US" altLang="en-US" dirty="0"/>
+          </a:p>
+          <a:p>
+            <a:pPr lvl="1"/>
+            <a:r>
+              <a:rPr lang="en-US" altLang="en-US" dirty="0"/>
+              <a:t>Methods </a:t>
+            </a:r>
+            <a:r>
+              <a:rPr lang="en-US" altLang="en-US" b="1" dirty="0" err="1">
+                <a:latin typeface="Courier New" panose="02070309020205020404" pitchFamily="49" charset="0"/>
+              </a:rPr>
+              <a:t>doGet</a:t>
+            </a:r>
+            <a:r>
+              <a:rPr lang="en-US" altLang="en-US" dirty="0"/>
+              <a:t> and </a:t>
+            </a:r>
+            <a:r>
+              <a:rPr lang="en-US" altLang="en-US" b="1" dirty="0" err="1">
+                <a:latin typeface="Courier New" panose="02070309020205020404" pitchFamily="49" charset="0"/>
+              </a:rPr>
+              <a:t>doPost</a:t>
+            </a:r>
+            <a:r>
+              <a:rPr lang="en-US" altLang="en-US" dirty="0"/>
+              <a:t> respond to </a:t>
+            </a:r>
+            <a:r>
+              <a:rPr lang="en-US" altLang="en-US" b="1" dirty="0">
+                <a:latin typeface="Courier New" panose="02070309020205020404" pitchFamily="49" charset="0"/>
+              </a:rPr>
+              <a:t>GET</a:t>
+            </a:r>
+            <a:r>
+              <a:rPr lang="en-US" altLang="en-US" dirty="0"/>
+              <a:t> and </a:t>
+            </a:r>
+            <a:r>
+              <a:rPr lang="en-US" altLang="en-US" b="1" dirty="0">
+                <a:latin typeface="Courier New" panose="02070309020205020404" pitchFamily="49" charset="0"/>
+              </a:rPr>
+              <a:t>POST</a:t>
+            </a:r>
+          </a:p>
+          <a:p>
+            <a:pPr lvl="2"/>
+            <a:r>
+              <a:rPr lang="en-US" altLang="en-US" dirty="0"/>
+              <a:t>Called by </a:t>
+            </a:r>
+            <a:r>
+              <a:rPr lang="en-US" altLang="en-US" b="1" dirty="0">
+                <a:latin typeface="Courier New" panose="02070309020205020404" pitchFamily="49" charset="0"/>
+              </a:rPr>
+              <a:t>service</a:t>
+            </a:r>
+          </a:p>
+          <a:p>
+            <a:pPr lvl="2"/>
+            <a:r>
+              <a:rPr lang="en-US" altLang="en-US" dirty="0"/>
+              <a:t>Receive </a:t>
+            </a:r>
+            <a:r>
+              <a:rPr lang="en-US" altLang="en-US" b="1" dirty="0" err="1">
+                <a:latin typeface="Courier New" panose="02070309020205020404" pitchFamily="49" charset="0"/>
+              </a:rPr>
+              <a:t>HttpServletRequest</a:t>
+            </a:r>
+            <a:r>
+              <a:rPr lang="en-US" altLang="en-US" dirty="0"/>
+              <a:t> and </a:t>
+            </a:r>
+            <a:r>
+              <a:rPr lang="en-US" altLang="en-US" b="1" dirty="0" err="1">
+                <a:latin typeface="Courier New" panose="02070309020205020404" pitchFamily="49" charset="0"/>
+              </a:rPr>
+              <a:t>HttpServletResponse</a:t>
+            </a:r>
+            <a:r>
+              <a:rPr lang="en-US" altLang="en-US" dirty="0"/>
+              <a:t> </a:t>
+            </a:r>
+            <a:r>
+              <a:rPr lang="en-US" altLang="en-US" dirty="0" smtClean="0"/>
+              <a:t>objects</a:t>
+            </a:r>
+            <a:endParaRPr lang="en-US" altLang="en-US" dirty="0"/>
+          </a:p>
+          <a:p>
+            <a:endParaRPr lang="en-US" dirty="0"/>
+          </a:p>
+        </p:txBody>
+      </p:sp>
+      <p:sp>
+        <p:nvSpPr>
+          <p:cNvPr id="4" name="TextBox 3"/>
+          <p:cNvSpPr txBox="1"/>
+          <p:nvPr/>
+        </p:nvSpPr>
+        <p:spPr>
+          <a:xfrm>
+            <a:off x="672663" y="5213131"/>
+            <a:ext cx="11214537" cy="1446550"/>
+          </a:xfrm>
+          <a:prstGeom prst="rect">
+            <a:avLst/>
+          </a:prstGeom>
+          <a:noFill/>
+        </p:spPr>
+        <p:txBody>
+          <a:bodyPr wrap="square" rtlCol="0">
+            <a:spAutoFit/>
+          </a:bodyPr>
+          <a:lstStyle/>
+          <a:p>
+            <a:pPr algn="just"/>
+            <a:r>
+              <a:rPr lang="en-US" sz="2200" b="1" dirty="0"/>
+              <a:t>GET</a:t>
+            </a:r>
+            <a:r>
+              <a:rPr lang="en-US" sz="2200" dirty="0"/>
+              <a:t> and </a:t>
+            </a:r>
+            <a:r>
+              <a:rPr lang="en-US" sz="2200" b="1" dirty="0"/>
+              <a:t>POST method</a:t>
+            </a:r>
+            <a:r>
+              <a:rPr lang="en-US" sz="2200" dirty="0"/>
+              <a:t> is used to transfer data from client to server in HTTP protocol but Main difference between </a:t>
+            </a:r>
+            <a:r>
+              <a:rPr lang="en-US" sz="2200" b="1" dirty="0"/>
+              <a:t>POST</a:t>
+            </a:r>
+            <a:r>
+              <a:rPr lang="en-US" sz="2200" dirty="0"/>
+              <a:t> and </a:t>
+            </a:r>
+            <a:r>
+              <a:rPr lang="en-US" sz="2200" b="1" dirty="0"/>
+              <a:t>GET method</a:t>
+            </a:r>
+            <a:r>
+              <a:rPr lang="en-US" sz="2200" dirty="0"/>
+              <a:t> is that </a:t>
+            </a:r>
+            <a:r>
+              <a:rPr lang="en-US" sz="2200" b="1" dirty="0"/>
+              <a:t>GET</a:t>
+            </a:r>
+            <a:r>
+              <a:rPr lang="en-US" sz="2200" dirty="0"/>
+              <a:t> carries </a:t>
+            </a:r>
+            <a:r>
+              <a:rPr lang="en-US" sz="2200" dirty="0">
+                <a:solidFill>
+                  <a:srgbClr val="FF0000"/>
+                </a:solidFill>
+              </a:rPr>
+              <a:t>request parameter appended in URL string </a:t>
+            </a:r>
+            <a:r>
+              <a:rPr lang="en-US" sz="2200" dirty="0"/>
+              <a:t>while </a:t>
+            </a:r>
+            <a:r>
+              <a:rPr lang="en-US" sz="2200" b="1" dirty="0"/>
+              <a:t>POST</a:t>
+            </a:r>
+            <a:r>
+              <a:rPr lang="en-US" sz="2200" dirty="0"/>
+              <a:t> carries </a:t>
+            </a:r>
+            <a:r>
+              <a:rPr lang="en-US" sz="2200" dirty="0">
+                <a:solidFill>
+                  <a:srgbClr val="FF0000"/>
+                </a:solidFill>
+              </a:rPr>
+              <a:t>request parameter in message body </a:t>
+            </a:r>
+            <a:r>
+              <a:rPr lang="en-US" sz="2200" dirty="0"/>
+              <a:t>which makes it more secure way of transferring data from client </a:t>
+            </a:r>
+            <a:r>
+              <a:rPr lang="en-US" sz="2200" dirty="0" smtClean="0"/>
+              <a:t>to server</a:t>
+            </a:r>
+            <a:endParaRPr lang="en-US" sz="2200" dirty="0"/>
+          </a:p>
+        </p:txBody>
+      </p:sp>
+    </p:spTree>
+    <p:extLst>
+      <p:ext uri="{BB962C8B-B14F-4D97-AF65-F5344CB8AC3E}">
+        <p14:creationId xmlns:p14="http://schemas.microsoft.com/office/powerpoint/2010/main" val="2141552117"/>
+      </p:ext>
+    </p:extLst>
+  </p:cSld>
+  <p:clrMapOvr>
+    <a:masterClrMapping/>
+  </p:clrMapOvr>
+</p:sld>
+</file>
+
+<file path=ppt/slides/slide54.xml><?xml version="1.0" encoding="utf-8"?>
+<p:sld xmlns:a="http://schemas.openxmlformats.org/drawingml/2006/main" xmlns:r="http://schemas.openxmlformats.org/officeDocument/2006/relationships" xmlns:p="http://schemas.openxmlformats.org/presentationml/2006/main">
+  <p:cSld>
+    <p:spTree>
+      <p:nvGrpSpPr>
+        <p:cNvPr id="1" name=""/>
+        <p:cNvGrpSpPr/>
+        <p:nvPr/>
+      </p:nvGrpSpPr>
+      <p:grpSpPr>
+        <a:xfrm>
+          <a:off x="0" y="0"/>
+          <a:ext cx="0" cy="0"/>
+          <a:chOff x="0" y="0"/>
+          <a:chExt cx="0" cy="0"/>
+        </a:xfrm>
+      </p:grpSpPr>
+      <p:sp>
+        <p:nvSpPr>
+          <p:cNvPr id="2" name="Title 1"/>
+          <p:cNvSpPr>
+            <a:spLocks noGrp="1"/>
+          </p:cNvSpPr>
+          <p:nvPr>
+            <p:ph type="title"/>
+          </p:nvPr>
+        </p:nvSpPr>
+        <p:spPr/>
+        <p:txBody>
+          <a:bodyPr/>
+          <a:lstStyle/>
+          <a:p>
+            <a:r>
+              <a:rPr lang="en-US" dirty="0" err="1" smtClean="0"/>
+              <a:t>HttpServletRequest</a:t>
+            </a:r>
+            <a:endParaRPr lang="en-US" dirty="0"/>
+          </a:p>
+        </p:txBody>
+      </p:sp>
+      <p:sp>
+        <p:nvSpPr>
+          <p:cNvPr id="3" name="Content Placeholder 2"/>
+          <p:cNvSpPr>
+            <a:spLocks noGrp="1"/>
+          </p:cNvSpPr>
+          <p:nvPr>
+            <p:ph idx="1"/>
+          </p:nvPr>
+        </p:nvSpPr>
+        <p:spPr/>
+        <p:txBody>
+          <a:bodyPr>
+            <a:normAutofit lnSpcReduction="10000"/>
+          </a:bodyPr>
+          <a:lstStyle/>
+          <a:p>
+            <a:r>
+              <a:rPr lang="en-US" altLang="en-US" b="1" dirty="0" err="1">
+                <a:latin typeface="Courier New" panose="02070309020205020404" pitchFamily="49" charset="0"/>
+              </a:rPr>
+              <a:t>HttpServletRequest</a:t>
+            </a:r>
+            <a:r>
+              <a:rPr lang="en-US" altLang="en-US" dirty="0"/>
+              <a:t> interface</a:t>
+            </a:r>
+          </a:p>
+          <a:p>
+            <a:pPr lvl="1"/>
+            <a:r>
+              <a:rPr lang="en-US" altLang="en-US" dirty="0"/>
+              <a:t>Object passed to </a:t>
+            </a:r>
+            <a:r>
+              <a:rPr lang="en-US" altLang="en-US" b="1" dirty="0" err="1">
+                <a:latin typeface="Courier New" panose="02070309020205020404" pitchFamily="49" charset="0"/>
+              </a:rPr>
+              <a:t>doGet</a:t>
+            </a:r>
+            <a:r>
+              <a:rPr lang="en-US" altLang="en-US" dirty="0"/>
+              <a:t> and </a:t>
+            </a:r>
+            <a:r>
+              <a:rPr lang="en-US" altLang="en-US" b="1" dirty="0" err="1">
+                <a:latin typeface="Courier New" panose="02070309020205020404" pitchFamily="49" charset="0"/>
+              </a:rPr>
+              <a:t>doPost</a:t>
+            </a:r>
+            <a:endParaRPr lang="en-US" altLang="en-US" b="1" dirty="0"/>
+          </a:p>
+          <a:p>
+            <a:pPr lvl="1"/>
+            <a:r>
+              <a:rPr lang="en-US" altLang="en-US" dirty="0"/>
+              <a:t>Extends </a:t>
+            </a:r>
+            <a:r>
+              <a:rPr lang="en-US" altLang="en-US" b="1" dirty="0" err="1">
+                <a:latin typeface="Courier New" panose="02070309020205020404" pitchFamily="49" charset="0"/>
+              </a:rPr>
+              <a:t>ServletRequest</a:t>
+            </a:r>
+            <a:endParaRPr lang="en-US" altLang="en-US" b="1" dirty="0">
+              <a:latin typeface="Courier New" panose="02070309020205020404" pitchFamily="49" charset="0"/>
+            </a:endParaRPr>
+          </a:p>
+          <a:p>
+            <a:r>
+              <a:rPr lang="en-US" altLang="en-US" dirty="0"/>
+              <a:t>Methods</a:t>
+            </a:r>
+          </a:p>
+          <a:p>
+            <a:pPr lvl="1"/>
+            <a:r>
+              <a:rPr lang="en-US" altLang="en-US" b="1" dirty="0">
+                <a:latin typeface="Courier New" panose="02070309020205020404" pitchFamily="49" charset="0"/>
+              </a:rPr>
+              <a:t>String </a:t>
+            </a:r>
+            <a:r>
+              <a:rPr lang="en-US" altLang="en-US" b="1" dirty="0" err="1">
+                <a:latin typeface="Courier New" panose="02070309020205020404" pitchFamily="49" charset="0"/>
+              </a:rPr>
+              <a:t>getParameter</a:t>
+            </a:r>
+            <a:r>
+              <a:rPr lang="en-US" altLang="en-US" b="1" dirty="0">
+                <a:latin typeface="Courier New" panose="02070309020205020404" pitchFamily="49" charset="0"/>
+              </a:rPr>
+              <a:t>( String name )</a:t>
+            </a:r>
+          </a:p>
+          <a:p>
+            <a:pPr lvl="2"/>
+            <a:r>
+              <a:rPr lang="en-US" altLang="en-US" dirty="0"/>
+              <a:t>Returns value of parameter </a:t>
+            </a:r>
+            <a:r>
+              <a:rPr lang="en-US" altLang="en-US" b="1" dirty="0">
+                <a:latin typeface="Courier New" panose="02070309020205020404" pitchFamily="49" charset="0"/>
+              </a:rPr>
+              <a:t>name</a:t>
+            </a:r>
+            <a:r>
+              <a:rPr lang="en-US" altLang="en-US" dirty="0"/>
+              <a:t> (part of </a:t>
+            </a:r>
+            <a:r>
+              <a:rPr lang="en-US" altLang="en-US" b="1" dirty="0">
+                <a:latin typeface="Courier New" panose="02070309020205020404" pitchFamily="49" charset="0"/>
+              </a:rPr>
+              <a:t>GET</a:t>
+            </a:r>
+            <a:r>
+              <a:rPr lang="en-US" altLang="en-US" dirty="0"/>
+              <a:t> or </a:t>
+            </a:r>
+            <a:r>
+              <a:rPr lang="en-US" altLang="en-US" b="1" dirty="0">
+                <a:latin typeface="Courier New" panose="02070309020205020404" pitchFamily="49" charset="0"/>
+              </a:rPr>
+              <a:t>POST</a:t>
+            </a:r>
+            <a:r>
+              <a:rPr lang="en-US" altLang="en-US" dirty="0"/>
+              <a:t>)</a:t>
+            </a:r>
+          </a:p>
+          <a:p>
+            <a:pPr lvl="1"/>
+            <a:r>
+              <a:rPr lang="en-US" altLang="en-US" b="1" dirty="0">
+                <a:latin typeface="Courier New" panose="02070309020205020404" pitchFamily="49" charset="0"/>
+              </a:rPr>
+              <a:t>Enumeration </a:t>
+            </a:r>
+            <a:r>
+              <a:rPr lang="en-US" altLang="en-US" b="1" dirty="0" err="1">
+                <a:latin typeface="Courier New" panose="02070309020205020404" pitchFamily="49" charset="0"/>
+              </a:rPr>
+              <a:t>getParameterNames</a:t>
+            </a:r>
+            <a:r>
+              <a:rPr lang="en-US" altLang="en-US" b="1" dirty="0">
+                <a:latin typeface="Courier New" panose="02070309020205020404" pitchFamily="49" charset="0"/>
+              </a:rPr>
+              <a:t>()</a:t>
+            </a:r>
+          </a:p>
+          <a:p>
+            <a:pPr lvl="2"/>
+            <a:r>
+              <a:rPr lang="en-US" altLang="en-US" dirty="0"/>
+              <a:t>Returns names of parameters (</a:t>
+            </a:r>
+            <a:r>
+              <a:rPr lang="en-US" altLang="en-US" b="1" dirty="0">
+                <a:latin typeface="Courier New" panose="02070309020205020404" pitchFamily="49" charset="0"/>
+              </a:rPr>
+              <a:t>POST</a:t>
+            </a:r>
+            <a:r>
+              <a:rPr lang="en-US" altLang="en-US" dirty="0"/>
+              <a:t>)</a:t>
+            </a:r>
+          </a:p>
+          <a:p>
+            <a:pPr lvl="1"/>
+            <a:r>
+              <a:rPr lang="en-US" altLang="en-US" b="1" dirty="0">
+                <a:latin typeface="Courier New" panose="02070309020205020404" pitchFamily="49" charset="0"/>
+              </a:rPr>
+              <a:t>String[] </a:t>
+            </a:r>
+            <a:r>
+              <a:rPr lang="en-US" altLang="en-US" b="1" dirty="0" err="1">
+                <a:latin typeface="Courier New" panose="02070309020205020404" pitchFamily="49" charset="0"/>
+              </a:rPr>
+              <a:t>getParameterValues</a:t>
+            </a:r>
+            <a:r>
+              <a:rPr lang="en-US" altLang="en-US" b="1" dirty="0">
+                <a:latin typeface="Courier New" panose="02070309020205020404" pitchFamily="49" charset="0"/>
+              </a:rPr>
+              <a:t>( String name )</a:t>
+            </a:r>
+          </a:p>
+          <a:p>
+            <a:pPr lvl="2"/>
+            <a:r>
+              <a:rPr lang="en-US" altLang="en-US" dirty="0"/>
+              <a:t>Returns array of strings containing values of a parameter</a:t>
+            </a:r>
+          </a:p>
+          <a:p>
+            <a:pPr lvl="1"/>
+            <a:r>
+              <a:rPr lang="en-US" altLang="en-US" b="1" dirty="0">
+                <a:latin typeface="Courier New" panose="02070309020205020404" pitchFamily="49" charset="0"/>
+              </a:rPr>
+              <a:t>Cookie[] </a:t>
+            </a:r>
+            <a:r>
+              <a:rPr lang="en-US" altLang="en-US" b="1" dirty="0" err="1">
+                <a:latin typeface="Courier New" panose="02070309020205020404" pitchFamily="49" charset="0"/>
+              </a:rPr>
+              <a:t>getCookies</a:t>
+            </a:r>
+            <a:r>
+              <a:rPr lang="en-US" altLang="en-US" b="1" dirty="0">
+                <a:latin typeface="Courier New" panose="02070309020205020404" pitchFamily="49" charset="0"/>
+              </a:rPr>
+              <a:t>()</a:t>
+            </a:r>
+          </a:p>
+          <a:p>
+            <a:pPr lvl="2"/>
+            <a:r>
+              <a:rPr lang="en-US" altLang="en-US" dirty="0"/>
+              <a:t>Returns array of </a:t>
+            </a:r>
+            <a:r>
+              <a:rPr lang="en-US" altLang="en-US" b="1" dirty="0">
+                <a:latin typeface="Courier New" panose="02070309020205020404" pitchFamily="49" charset="0"/>
+              </a:rPr>
+              <a:t>Cookie</a:t>
+            </a:r>
+            <a:r>
+              <a:rPr lang="en-US" altLang="en-US" dirty="0"/>
+              <a:t> objects, can be used to identify client</a:t>
+            </a:r>
+          </a:p>
+          <a:p>
+            <a:endParaRPr lang="en-US" dirty="0"/>
+          </a:p>
+        </p:txBody>
+      </p:sp>
+    </p:spTree>
+    <p:extLst>
+      <p:ext uri="{BB962C8B-B14F-4D97-AF65-F5344CB8AC3E}">
+        <p14:creationId xmlns:p14="http://schemas.microsoft.com/office/powerpoint/2010/main" val="3327961635"/>
+      </p:ext>
+    </p:extLst>
+  </p:cSld>
+  <p:clrMapOvr>
+    <a:masterClrMapping/>
+  </p:clrMapOvr>
+</p:sld>
+</file>
+
+<file path=ppt/slides/slide55.xml><?xml version="1.0" encoding="utf-8"?>
+<p:sld xmlns:a="http://schemas.openxmlformats.org/drawingml/2006/main" xmlns:r="http://schemas.openxmlformats.org/officeDocument/2006/relationships" xmlns:p="http://schemas.openxmlformats.org/presentationml/2006/main">
+  <p:cSld>
+    <p:spTree>
+      <p:nvGrpSpPr>
+        <p:cNvPr id="1" name=""/>
+        <p:cNvGrpSpPr/>
+        <p:nvPr/>
+      </p:nvGrpSpPr>
+      <p:grpSpPr>
+        <a:xfrm>
+          <a:off x="0" y="0"/>
+          <a:ext cx="0" cy="0"/>
+          <a:chOff x="0" y="0"/>
+          <a:chExt cx="0" cy="0"/>
+        </a:xfrm>
+      </p:grpSpPr>
+      <p:sp>
+        <p:nvSpPr>
+          <p:cNvPr id="2" name="Title 1"/>
+          <p:cNvSpPr>
+            <a:spLocks noGrp="1"/>
+          </p:cNvSpPr>
+          <p:nvPr>
+            <p:ph type="title"/>
+          </p:nvPr>
+        </p:nvSpPr>
+        <p:spPr/>
+        <p:txBody>
+          <a:bodyPr/>
+          <a:lstStyle/>
+          <a:p>
+            <a:r>
+              <a:rPr lang="en-US" dirty="0" err="1" smtClean="0"/>
+              <a:t>HttpServletResponse</a:t>
+            </a:r>
+            <a:endParaRPr lang="en-US" dirty="0"/>
+          </a:p>
+        </p:txBody>
+      </p:sp>
+      <p:sp>
+        <p:nvSpPr>
+          <p:cNvPr id="3" name="Content Placeholder 2"/>
+          <p:cNvSpPr>
+            <a:spLocks noGrp="1"/>
+          </p:cNvSpPr>
+          <p:nvPr>
+            <p:ph idx="1"/>
+          </p:nvPr>
+        </p:nvSpPr>
+        <p:spPr/>
+        <p:txBody>
+          <a:bodyPr>
+            <a:normAutofit fontScale="92500" lnSpcReduction="20000"/>
+          </a:bodyPr>
+          <a:lstStyle/>
+          <a:p>
+            <a:r>
+              <a:rPr lang="en-US" altLang="en-US" sz="2400" b="1" dirty="0" err="1">
+                <a:latin typeface="Courier New" panose="02070309020205020404" pitchFamily="49" charset="0"/>
+              </a:rPr>
+              <a:t>HttpServletResponse</a:t>
+            </a:r>
+            <a:endParaRPr lang="en-US" altLang="en-US" sz="2400" b="1" dirty="0">
+              <a:latin typeface="Courier New" panose="02070309020205020404" pitchFamily="49" charset="0"/>
+            </a:endParaRPr>
+          </a:p>
+          <a:p>
+            <a:pPr lvl="1"/>
+            <a:r>
+              <a:rPr lang="en-US" altLang="en-US" dirty="0"/>
+              <a:t>Object passed to </a:t>
+            </a:r>
+            <a:r>
+              <a:rPr lang="en-US" altLang="en-US" b="1" dirty="0" err="1">
+                <a:latin typeface="Courier New" panose="02070309020205020404" pitchFamily="49" charset="0"/>
+              </a:rPr>
+              <a:t>doGet</a:t>
+            </a:r>
+            <a:r>
+              <a:rPr lang="en-US" altLang="en-US" dirty="0"/>
+              <a:t> and </a:t>
+            </a:r>
+            <a:r>
+              <a:rPr lang="en-US" altLang="en-US" b="1" dirty="0" err="1">
+                <a:latin typeface="Courier New" panose="02070309020205020404" pitchFamily="49" charset="0"/>
+              </a:rPr>
+              <a:t>doPost</a:t>
+            </a:r>
+            <a:endParaRPr lang="en-US" altLang="en-US" b="1" dirty="0">
+              <a:latin typeface="Courier New" panose="02070309020205020404" pitchFamily="49" charset="0"/>
+            </a:endParaRPr>
+          </a:p>
+          <a:p>
+            <a:pPr lvl="1"/>
+            <a:r>
+              <a:rPr lang="en-US" altLang="en-US" dirty="0"/>
+              <a:t>Extends </a:t>
+            </a:r>
+            <a:r>
+              <a:rPr lang="en-US" altLang="en-US" b="1" dirty="0" err="1">
+                <a:latin typeface="Courier New" panose="02070309020205020404" pitchFamily="49" charset="0"/>
+              </a:rPr>
+              <a:t>ServletResponse</a:t>
+            </a:r>
+            <a:endParaRPr lang="en-US" altLang="en-US" dirty="0"/>
+          </a:p>
+          <a:p>
+            <a:r>
+              <a:rPr lang="en-US" altLang="en-US" sz="2400" dirty="0"/>
+              <a:t>Methods</a:t>
+            </a:r>
+          </a:p>
+          <a:p>
+            <a:pPr lvl="1"/>
+            <a:r>
+              <a:rPr lang="en-US" altLang="en-US" b="1" dirty="0">
+                <a:latin typeface="Courier New" panose="02070309020205020404" pitchFamily="49" charset="0"/>
+              </a:rPr>
+              <a:t>void </a:t>
+            </a:r>
+            <a:r>
+              <a:rPr lang="en-US" altLang="en-US" b="1" dirty="0" err="1">
+                <a:latin typeface="Courier New" panose="02070309020205020404" pitchFamily="49" charset="0"/>
+              </a:rPr>
+              <a:t>addCookie</a:t>
+            </a:r>
+            <a:r>
+              <a:rPr lang="en-US" altLang="en-US" b="1" dirty="0">
+                <a:latin typeface="Courier New" panose="02070309020205020404" pitchFamily="49" charset="0"/>
+              </a:rPr>
+              <a:t>( Cookie </a:t>
+            </a:r>
+            <a:r>
+              <a:rPr lang="en-US" altLang="en-US" b="1" dirty="0" err="1">
+                <a:latin typeface="Courier New" panose="02070309020205020404" pitchFamily="49" charset="0"/>
+              </a:rPr>
+              <a:t>cookie</a:t>
+            </a:r>
+            <a:r>
+              <a:rPr lang="en-US" altLang="en-US" b="1" dirty="0">
+                <a:latin typeface="Courier New" panose="02070309020205020404" pitchFamily="49" charset="0"/>
+              </a:rPr>
+              <a:t> )</a:t>
+            </a:r>
+          </a:p>
+          <a:p>
+            <a:pPr lvl="2"/>
+            <a:r>
+              <a:rPr lang="en-US" altLang="en-US" sz="1800" dirty="0"/>
+              <a:t>Add </a:t>
+            </a:r>
+            <a:r>
+              <a:rPr lang="en-US" altLang="en-US" sz="1800" b="1" dirty="0">
+                <a:latin typeface="Courier New" panose="02070309020205020404" pitchFamily="49" charset="0"/>
+              </a:rPr>
+              <a:t>Cookie</a:t>
+            </a:r>
+            <a:r>
+              <a:rPr lang="en-US" altLang="en-US" sz="1800" dirty="0"/>
+              <a:t> to header of response to client</a:t>
+            </a:r>
+          </a:p>
+          <a:p>
+            <a:pPr lvl="1"/>
+            <a:r>
+              <a:rPr lang="en-US" altLang="en-US" b="1" dirty="0" err="1">
+                <a:latin typeface="Courier New" panose="02070309020205020404" pitchFamily="49" charset="0"/>
+              </a:rPr>
+              <a:t>ServletOutputStream</a:t>
+            </a:r>
+            <a:r>
+              <a:rPr lang="en-US" altLang="en-US" b="1" dirty="0">
+                <a:latin typeface="Courier New" panose="02070309020205020404" pitchFamily="49" charset="0"/>
+              </a:rPr>
+              <a:t> </a:t>
+            </a:r>
+            <a:r>
+              <a:rPr lang="en-US" altLang="en-US" b="1" dirty="0" err="1">
+                <a:latin typeface="Courier New" panose="02070309020205020404" pitchFamily="49" charset="0"/>
+              </a:rPr>
+              <a:t>getOutputStream</a:t>
+            </a:r>
+            <a:r>
+              <a:rPr lang="en-US" altLang="en-US" b="1" dirty="0">
+                <a:latin typeface="Courier New" panose="02070309020205020404" pitchFamily="49" charset="0"/>
+              </a:rPr>
+              <a:t>()</a:t>
+            </a:r>
+          </a:p>
+          <a:p>
+            <a:pPr lvl="2"/>
+            <a:r>
+              <a:rPr lang="en-US" altLang="en-US" sz="1800" dirty="0"/>
+              <a:t>Gets byte-based output stream, send binary data to client</a:t>
+            </a:r>
+          </a:p>
+          <a:p>
+            <a:pPr lvl="1"/>
+            <a:r>
+              <a:rPr lang="en-US" altLang="en-US" b="1" dirty="0" err="1">
+                <a:latin typeface="Courier New" panose="02070309020205020404" pitchFamily="49" charset="0"/>
+              </a:rPr>
+              <a:t>PrintWriter</a:t>
+            </a:r>
+            <a:r>
+              <a:rPr lang="en-US" altLang="en-US" b="1" dirty="0">
+                <a:latin typeface="Courier New" panose="02070309020205020404" pitchFamily="49" charset="0"/>
+              </a:rPr>
+              <a:t> </a:t>
+            </a:r>
+            <a:r>
+              <a:rPr lang="en-US" altLang="en-US" b="1" dirty="0" err="1">
+                <a:latin typeface="Courier New" panose="02070309020205020404" pitchFamily="49" charset="0"/>
+              </a:rPr>
+              <a:t>getWriter</a:t>
+            </a:r>
+            <a:r>
+              <a:rPr lang="en-US" altLang="en-US" b="1" dirty="0">
+                <a:latin typeface="Courier New" panose="02070309020205020404" pitchFamily="49" charset="0"/>
+              </a:rPr>
+              <a:t>()</a:t>
+            </a:r>
+          </a:p>
+          <a:p>
+            <a:pPr lvl="2"/>
+            <a:r>
+              <a:rPr lang="en-US" altLang="en-US" sz="1800" dirty="0"/>
+              <a:t>Gets character-based output stream, send text to client</a:t>
+            </a:r>
+          </a:p>
+          <a:p>
+            <a:pPr lvl="1"/>
+            <a:r>
+              <a:rPr lang="en-US" altLang="en-US" b="1" dirty="0">
+                <a:latin typeface="Courier New" panose="02070309020205020404" pitchFamily="49" charset="0"/>
+              </a:rPr>
+              <a:t>void </a:t>
+            </a:r>
+            <a:r>
+              <a:rPr lang="en-US" altLang="en-US" b="1" dirty="0" err="1">
+                <a:latin typeface="Courier New" panose="02070309020205020404" pitchFamily="49" charset="0"/>
+              </a:rPr>
+              <a:t>setContentType</a:t>
+            </a:r>
+            <a:r>
+              <a:rPr lang="en-US" altLang="en-US" b="1" dirty="0">
+                <a:latin typeface="Courier New" panose="02070309020205020404" pitchFamily="49" charset="0"/>
+              </a:rPr>
+              <a:t>( String type )</a:t>
+            </a:r>
+          </a:p>
+          <a:p>
+            <a:pPr lvl="2"/>
+            <a:r>
+              <a:rPr lang="en-US" altLang="en-US" sz="1800" dirty="0"/>
+              <a:t>Specify MIME type of the response (</a:t>
+            </a:r>
+            <a:r>
+              <a:rPr lang="en-US" altLang="en-US" sz="1800" dirty="0">
+                <a:latin typeface="Verdana" panose="020B0604030504040204" pitchFamily="34" charset="0"/>
+              </a:rPr>
+              <a:t>Multipurpose Internet Mail Extensions)</a:t>
+            </a:r>
+          </a:p>
+          <a:p>
+            <a:pPr lvl="2"/>
+            <a:r>
+              <a:rPr lang="en-US" altLang="en-US" sz="1800" dirty="0"/>
+              <a:t>MIME type “text/html” indicates that response is HTML document.</a:t>
+            </a:r>
+          </a:p>
+          <a:p>
+            <a:pPr lvl="2"/>
+            <a:r>
+              <a:rPr lang="en-US" altLang="en-US" sz="1800" dirty="0"/>
+              <a:t>Helps display data</a:t>
+            </a:r>
+          </a:p>
+          <a:p>
+            <a:endParaRPr lang="en-US" dirty="0"/>
+          </a:p>
+        </p:txBody>
+      </p:sp>
+    </p:spTree>
+    <p:extLst>
+      <p:ext uri="{BB962C8B-B14F-4D97-AF65-F5344CB8AC3E}">
+        <p14:creationId xmlns:p14="http://schemas.microsoft.com/office/powerpoint/2010/main" val="208910461"/>
       </p:ext>
     </p:extLst>
   </p:cSld>

</xml_diff>